<commit_message>
Working on Poster Presentation
</commit_message>
<xml_diff>
--- a/Final Paper and Presentation/Poster Presentation.pptx
+++ b/Final Paper and Presentation/Poster Presentation.pptx
@@ -127,32 +127,6 @@
 <p188:authorLst xmlns:a="http://schemas.openxmlformats.org/drawingml/2006/main" xmlns:r="http://schemas.openxmlformats.org/officeDocument/2006/relationships" xmlns:p188="http://schemas.microsoft.com/office/powerpoint/2018/8/main">
   <p188:author id="{76EE9127-1041-C9C2-8C1D-3E1C03055AD9}" name="Jessica Hope Coomber" initials="JC" userId="S::coombe_j1@denison.edu::54022637-a59a-42ce-89f8-012a5d62c9be" providerId="AD"/>
 </p188:authorLst>
-</file>
-
-<file path=ppt/comments/modernComment_100_0.xml><?xml version="1.0" encoding="utf-8"?>
-<p188:cmLst xmlns:a="http://schemas.openxmlformats.org/drawingml/2006/main" xmlns:r="http://schemas.openxmlformats.org/officeDocument/2006/relationships" xmlns:p188="http://schemas.microsoft.com/office/powerpoint/2018/8/main">
-  <p188:cm id="{2D8B37FB-AC04-D341-AF4A-4FE3EB82E3FB}" authorId="{76EE9127-1041-C9C2-8C1D-3E1C03055AD9}" created="2025-04-29T03:09:40.272">
-    <ac:txMkLst xmlns:ac="http://schemas.microsoft.com/office/drawing/2013/main/command">
-      <pc:docMk xmlns:pc="http://schemas.microsoft.com/office/powerpoint/2013/main/command"/>
-      <pc:sldMk xmlns:pc="http://schemas.microsoft.com/office/powerpoint/2013/main/command" cId="0" sldId="256"/>
-      <ac:spMk id="6" creationId="{00000000-0000-0000-0000-000000000000}"/>
-      <ac:txMk cp="0" len="7">
-        <ac:context len="1123" hash="4110286177"/>
-      </ac:txMk>
-    </ac:txMkLst>
-    <p188:pos x="6539516" y="2184482"/>
-    <p188:txBody>
-      <a:bodyPr/>
-      <a:lstStyle/>
-      <a:p>
-        <a:r>
-          <a:rPr lang="en-US"/>
-          <a:t>Turn text into bullets</a:t>
-        </a:r>
-      </a:p>
-    </p188:txBody>
-  </p188:cm>
-</p188:cmLst>
 </file>
 
 <file path=ppt/slideLayouts/slideLayout1.xml><?xml version="1.0" encoding="utf-8"?>
@@ -3072,6 +3046,14 @@
 <file path=ppt/slides/slide1.xml><?xml version="1.0" encoding="utf-8"?>
 <p:sld xmlns:a="http://schemas.openxmlformats.org/drawingml/2006/main" xmlns:r="http://schemas.openxmlformats.org/officeDocument/2006/relationships" xmlns:p="http://schemas.openxmlformats.org/presentationml/2006/main">
   <p:cSld>
+    <p:bg>
+      <p:bgPr>
+        <a:solidFill>
+          <a:schemeClr val="bg1"/>
+        </a:solidFill>
+        <a:effectLst/>
+      </p:bgPr>
+    </p:bg>
     <p:spTree>
       <p:nvGrpSpPr>
         <p:cNvPr id="1" name=""/>
@@ -3152,8 +3134,8 @@
         </p:nvSpPr>
         <p:spPr>
           <a:xfrm>
-            <a:off x="844228" y="4639477"/>
-            <a:ext cx="10230696" cy="11572399"/>
+            <a:off x="708060" y="4570792"/>
+            <a:ext cx="10230696" cy="12064841"/>
           </a:xfrm>
           <a:prstGeom prst="rect">
             <a:avLst/>
@@ -3185,70 +3167,151 @@
             </a:endParaRPr>
           </a:p>
           <a:p>
+            <a:pPr>
+              <a:lnSpc>
+                <a:spcPct val="200000"/>
+              </a:lnSpc>
+            </a:pPr>
+            <a:r>
+              <a:rPr lang="en-US" sz="3200" b="1" dirty="0">
+                <a:latin typeface="Times New Roman"/>
+                <a:cs typeface="Times New Roman"/>
+              </a:rPr>
+              <a:t>Research Aim:</a:t>
+            </a:r>
+          </a:p>
+          <a:p>
+            <a:pPr marL="457200" indent="-457200">
+              <a:buFont typeface="Arial" panose="020B0604020202020204" pitchFamily="34" charset="0"/>
+              <a:buChar char="•"/>
+            </a:pPr>
             <a:r>
               <a:rPr lang="en-US" sz="3200" dirty="0">
                 <a:latin typeface="Times New Roman"/>
                 <a:cs typeface="Times New Roman"/>
               </a:rPr>
-              <a:t>This research aims to understand the factors impacting the use of telehealth visits for Medicare and Medicaid members in the US during 2020-2024. </a:t>
-            </a:r>
-          </a:p>
-          <a:p>
-            <a:endParaRPr lang="en-US" sz="3200" dirty="0">
-              <a:latin typeface="Times New Roman"/>
-              <a:cs typeface="Times New Roman"/>
-            </a:endParaRPr>
-          </a:p>
-          <a:p>
+              <a:t>Understand the factors impacting the use of telehealth visits for Medicare and Medicaid members </a:t>
+            </a:r>
+          </a:p>
+          <a:p>
+            <a:pPr>
+              <a:lnSpc>
+                <a:spcPct val="200000"/>
+              </a:lnSpc>
+            </a:pPr>
+            <a:r>
+              <a:rPr lang="en-US" sz="3200" b="1" dirty="0">
+                <a:latin typeface="Times New Roman"/>
+                <a:cs typeface="Times New Roman"/>
+              </a:rPr>
+              <a:t>Dataset:</a:t>
+            </a:r>
+          </a:p>
+          <a:p>
+            <a:pPr marL="457200" indent="-457200">
+              <a:buFont typeface="Arial" panose="020B0604020202020204" pitchFamily="34" charset="0"/>
+              <a:buChar char="•"/>
+            </a:pPr>
             <a:r>
               <a:rPr lang="en-US" sz="3200" dirty="0">
                 <a:latin typeface="Times New Roman"/>
                 <a:cs typeface="Times New Roman"/>
               </a:rPr>
-              <a:t>The Medicare Telehealth Trends dataset is merged with publicly available data from the US Census Bureau and the Transit Report Card from Transportation for America in order to include variables that suggest economic status of an individual. </a:t>
-            </a:r>
-          </a:p>
-          <a:p>
-            <a:endParaRPr lang="en-US" sz="3200" dirty="0">
-              <a:latin typeface="Times New Roman"/>
-              <a:cs typeface="Times New Roman"/>
-            </a:endParaRPr>
-          </a:p>
-          <a:p>
+              <a:t>Medicare Telehealth Trends dataset (CMS)</a:t>
+            </a:r>
+          </a:p>
+          <a:p>
+            <a:pPr marL="457200" indent="-457200">
+              <a:buFont typeface="Arial" panose="020B0604020202020204" pitchFamily="34" charset="0"/>
+              <a:buChar char="•"/>
+            </a:pPr>
             <a:r>
               <a:rPr lang="en-US" sz="3200" dirty="0">
                 <a:latin typeface="Times New Roman"/>
                 <a:cs typeface="Times New Roman"/>
               </a:rPr>
-              <a:t>Fixed effect analysis is used to assess the relationship between the variables and the number of telehealth visits per capita, while controlling for state and year. </a:t>
-            </a:r>
-          </a:p>
-          <a:p>
-            <a:endParaRPr lang="en-US" sz="3200" dirty="0">
-              <a:latin typeface="Times New Roman"/>
-              <a:cs typeface="Times New Roman"/>
-            </a:endParaRPr>
-          </a:p>
-          <a:p>
+              <a:t>Publicly available data from US Census Bureau </a:t>
+            </a:r>
+          </a:p>
+          <a:p>
+            <a:pPr marL="457200" indent="-457200">
+              <a:buFont typeface="Arial" panose="020B0604020202020204" pitchFamily="34" charset="0"/>
+              <a:buChar char="•"/>
+            </a:pPr>
             <a:r>
               <a:rPr lang="en-US" sz="3200" dirty="0">
                 <a:latin typeface="Times New Roman"/>
                 <a:cs typeface="Times New Roman"/>
               </a:rPr>
-              <a:t>This research can be used to understand potential socioeconomic barriers to telehealth access to aid opportunities for targeted interventions to improve equitable access to care.</a:t>
-            </a:r>
-          </a:p>
-          <a:p>
-            <a:endParaRPr lang="en-US" sz="3200" dirty="0">
-              <a:latin typeface="Times New Roman"/>
-              <a:cs typeface="Times New Roman"/>
-            </a:endParaRPr>
-          </a:p>
-          <a:p>
-            <a:endParaRPr lang="en-US" sz="3200" dirty="0">
-              <a:latin typeface="Times New Roman"/>
-              <a:cs typeface="Times New Roman"/>
-            </a:endParaRPr>
+              <a:t>The Transit Report Card from Transportation for America </a:t>
+            </a:r>
+          </a:p>
+          <a:p>
+            <a:pPr>
+              <a:lnSpc>
+                <a:spcPct val="200000"/>
+              </a:lnSpc>
+            </a:pPr>
+            <a:r>
+              <a:rPr lang="en-US" sz="3200" b="1" dirty="0">
+                <a:latin typeface="Times New Roman"/>
+                <a:cs typeface="Times New Roman"/>
+              </a:rPr>
+              <a:t>Fixed Effect Analysis:</a:t>
+            </a:r>
+          </a:p>
+          <a:p>
+            <a:pPr marL="457200" indent="-457200">
+              <a:buFont typeface="Arial" panose="020B0604020202020204" pitchFamily="34" charset="0"/>
+              <a:buChar char="•"/>
+            </a:pPr>
+            <a:r>
+              <a:rPr lang="en-US" sz="3200" dirty="0">
+                <a:latin typeface="Times New Roman"/>
+                <a:cs typeface="Times New Roman"/>
+              </a:rPr>
+              <a:t> Used to assess the relationship between the variables and the number of telehealth visits per capita, while controlling for state and year.</a:t>
+            </a:r>
+          </a:p>
+          <a:p>
+            <a:pPr>
+              <a:lnSpc>
+                <a:spcPct val="200000"/>
+              </a:lnSpc>
+            </a:pPr>
+            <a:r>
+              <a:rPr lang="en-US" sz="3200" b="1" dirty="0">
+                <a:latin typeface="Times New Roman"/>
+                <a:cs typeface="Times New Roman"/>
+              </a:rPr>
+              <a:t>Implications:</a:t>
+            </a:r>
+          </a:p>
+          <a:p>
+            <a:pPr marL="457200" indent="-457200">
+              <a:buFont typeface="Arial" panose="020B0604020202020204" pitchFamily="34" charset="0"/>
+              <a:buChar char="•"/>
+            </a:pPr>
+            <a:r>
+              <a:rPr lang="en-US" sz="3200" dirty="0">
+                <a:latin typeface="Times New Roman"/>
+                <a:cs typeface="Times New Roman"/>
+              </a:rPr>
+              <a:t>Used to understand potential socioeconomic barriers to telehealth access</a:t>
+            </a:r>
+          </a:p>
+          <a:p>
+            <a:pPr marL="457200" indent="-457200">
+              <a:buFont typeface="Arial" panose="020B0604020202020204" pitchFamily="34" charset="0"/>
+              <a:buChar char="•"/>
+            </a:pPr>
+            <a:r>
+              <a:rPr lang="en-US" sz="3200" dirty="0">
+                <a:latin typeface="Times New Roman"/>
+                <a:cs typeface="Times New Roman"/>
+              </a:rPr>
+              <a:t>Aid opportunities for targeted interventions to improve equitable access to care.</a:t>
+            </a:r>
           </a:p>
           <a:p>
             <a:endParaRPr lang="en-US" sz="3200" dirty="0">
@@ -3266,8 +3329,8 @@
         </p:nvSpPr>
         <p:spPr>
           <a:xfrm>
-            <a:off x="721896" y="17286859"/>
-            <a:ext cx="10230697" cy="14527054"/>
+            <a:off x="810166" y="17478380"/>
+            <a:ext cx="10167169" cy="15019496"/>
           </a:xfrm>
           <a:prstGeom prst="rect">
             <a:avLst/>
@@ -3303,12 +3366,18 @@
             </a:endParaRPr>
           </a:p>
           <a:p>
+            <a:endParaRPr lang="en-US" sz="3200" dirty="0">
+              <a:latin typeface="Times New Roman" panose="02020603050405020304" pitchFamily="18" charset="0"/>
+              <a:cs typeface="Times New Roman" panose="02020603050405020304" pitchFamily="18" charset="0"/>
+            </a:endParaRPr>
+          </a:p>
+          <a:p>
             <a:r>
               <a:rPr lang="en-US" sz="3200" dirty="0">
                 <a:latin typeface="Times New Roman" panose="02020603050405020304" pitchFamily="18" charset="0"/>
                 <a:cs typeface="Times New Roman" panose="02020603050405020304" pitchFamily="18" charset="0"/>
               </a:rPr>
-              <a:t>For initial exploration, I use bar plots to visualize TelehealthVisits (number of unique telehealth visits) across demographics categories (rural/urban, race, year, and enrollment status). </a:t>
+              <a:t>A fixed effect analysis is used to assess the association between various variables and the number of telehealth visits while controlling for state and year. </a:t>
             </a:r>
           </a:p>
           <a:p>
@@ -3318,58 +3387,186 @@
             </a:endParaRPr>
           </a:p>
           <a:p>
+            <a:pPr marL="457200" indent="-457200">
+              <a:buFont typeface="Arial" panose="020B0604020202020204" pitchFamily="34" charset="0"/>
+              <a:buChar char="•"/>
+            </a:pPr>
             <a:r>
               <a:rPr lang="en-US" sz="3200" dirty="0">
                 <a:latin typeface="Times New Roman" panose="02020603050405020304" pitchFamily="18" charset="0"/>
                 <a:cs typeface="Times New Roman" panose="02020603050405020304" pitchFamily="18" charset="0"/>
               </a:rPr>
-              <a:t>Next, I use a fixed effect analysis to assess the association between various variables and the number of telehealth visits while controlling for state and year. Fixed effect models control for time invariant variables and in this case controls for differences between states and years. </a:t>
-            </a:r>
-          </a:p>
-          <a:p>
+              <a:t>Fixed effect models control for time invariant variables and in this case controls for differences between states and years. </a:t>
+            </a:r>
+          </a:p>
+          <a:p>
+            <a:pPr>
+              <a:lnSpc>
+                <a:spcPct val="200000"/>
+              </a:lnSpc>
+            </a:pPr>
+            <a:r>
+              <a:rPr lang="en-US" sz="3200" dirty="0">
+                <a:latin typeface="Times New Roman" panose="02020603050405020304" pitchFamily="18" charset="0"/>
+                <a:cs typeface="Times New Roman" panose="02020603050405020304" pitchFamily="18" charset="0"/>
+              </a:rPr>
+              <a:t>Variables are chosen for the fixed effect model:</a:t>
+            </a:r>
+          </a:p>
+          <a:p>
+            <a:pPr marL="514350" indent="-514350">
+              <a:buFont typeface="+mj-lt"/>
+              <a:buAutoNum type="arabicPeriod"/>
+            </a:pPr>
+            <a:r>
+              <a:rPr lang="en-US" sz="3200" dirty="0">
+                <a:latin typeface="Times New Roman" panose="02020603050405020304" pitchFamily="18" charset="0"/>
+                <a:cs typeface="Times New Roman" panose="02020603050405020304" pitchFamily="18" charset="0"/>
+              </a:rPr>
+              <a:t>The Number of Vehicles Owned</a:t>
+            </a:r>
+          </a:p>
+          <a:p>
+            <a:pPr marL="514350" indent="-514350">
+              <a:buFont typeface="+mj-lt"/>
+              <a:buAutoNum type="arabicPeriod"/>
+            </a:pPr>
+            <a:r>
+              <a:rPr lang="en-US" sz="3200" dirty="0">
+                <a:latin typeface="Times New Roman" panose="02020603050405020304" pitchFamily="18" charset="0"/>
+                <a:cs typeface="Times New Roman" panose="02020603050405020304" pitchFamily="18" charset="0"/>
+              </a:rPr>
+              <a:t>Transit Spending Per Capita</a:t>
+            </a:r>
+          </a:p>
+          <a:p>
+            <a:pPr marL="514350" indent="-514350">
+              <a:buFont typeface="+mj-lt"/>
+              <a:buAutoNum type="arabicPeriod"/>
+            </a:pPr>
+            <a:r>
+              <a:rPr lang="en-US" sz="3200" dirty="0">
+                <a:latin typeface="Times New Roman" panose="02020603050405020304" pitchFamily="18" charset="0"/>
+                <a:cs typeface="Times New Roman" panose="02020603050405020304" pitchFamily="18" charset="0"/>
+              </a:rPr>
+              <a:t>Having Internet Access</a:t>
+            </a:r>
+          </a:p>
+          <a:p>
+            <a:pPr marL="514350" indent="-514350">
+              <a:buFont typeface="+mj-lt"/>
+              <a:buAutoNum type="arabicPeriod"/>
+            </a:pPr>
+            <a:r>
+              <a:rPr lang="en-US" sz="3200" dirty="0">
+                <a:latin typeface="Times New Roman" panose="02020603050405020304" pitchFamily="18" charset="0"/>
+                <a:cs typeface="Times New Roman" panose="02020603050405020304" pitchFamily="18" charset="0"/>
+              </a:rPr>
+              <a:t>Number of Hospitals</a:t>
+            </a:r>
+          </a:p>
+          <a:p>
+            <a:pPr marL="514350" indent="-514350">
+              <a:buFont typeface="+mj-lt"/>
+              <a:buAutoNum type="arabicPeriod"/>
+            </a:pPr>
+            <a:r>
+              <a:rPr lang="en-US" sz="3200" dirty="0">
+                <a:latin typeface="Times New Roman" panose="02020603050405020304" pitchFamily="18" charset="0"/>
+                <a:cs typeface="Times New Roman" panose="02020603050405020304" pitchFamily="18" charset="0"/>
+              </a:rPr>
+              <a:t>Number of Physicians</a:t>
+            </a:r>
+          </a:p>
+          <a:p>
+            <a:pPr marL="514350" indent="-514350">
+              <a:buFont typeface="+mj-lt"/>
+              <a:buAutoNum type="arabicPeriod"/>
+            </a:pPr>
+            <a:r>
+              <a:rPr lang="en-US" sz="3200" dirty="0">
+                <a:latin typeface="Times New Roman" panose="02020603050405020304" pitchFamily="18" charset="0"/>
+                <a:cs typeface="Times New Roman" panose="02020603050405020304" pitchFamily="18" charset="0"/>
+              </a:rPr>
+              <a:t>Poverty Level </a:t>
+            </a:r>
+          </a:p>
+          <a:p>
+            <a:pPr>
+              <a:lnSpc>
+                <a:spcPct val="200000"/>
+              </a:lnSpc>
+            </a:pPr>
+            <a:r>
+              <a:rPr lang="en-US" sz="3200" dirty="0">
+                <a:latin typeface="Times New Roman" panose="02020603050405020304" pitchFamily="18" charset="0"/>
+                <a:cs typeface="Times New Roman" panose="02020603050405020304" pitchFamily="18" charset="0"/>
+              </a:rPr>
+              <a:t>Evaluate the fit of the model:</a:t>
+            </a:r>
+          </a:p>
+          <a:p>
+            <a:pPr marL="457200" indent="-457200">
+              <a:buFont typeface="Arial" panose="020B0604020202020204" pitchFamily="34" charset="0"/>
+              <a:buChar char="•"/>
+            </a:pPr>
+            <a:r>
+              <a:rPr lang="en-US" sz="3200" dirty="0">
+                <a:latin typeface="Times New Roman" panose="02020603050405020304" pitchFamily="18" charset="0"/>
+                <a:cs typeface="Times New Roman" panose="02020603050405020304" pitchFamily="18" charset="0"/>
+              </a:rPr>
+              <a:t>R^2 represents how well the model explains variation within each fixed-effect group.</a:t>
+            </a:r>
+          </a:p>
+          <a:p>
+            <a:pPr>
+              <a:lnSpc>
+                <a:spcPct val="200000"/>
+              </a:lnSpc>
+            </a:pPr>
+            <a:r>
+              <a:rPr lang="en-US" sz="3200" dirty="0">
+                <a:latin typeface="Times New Roman" panose="02020603050405020304" pitchFamily="18" charset="0"/>
+                <a:cs typeface="Times New Roman" panose="02020603050405020304" pitchFamily="18" charset="0"/>
+              </a:rPr>
+              <a:t>Variance Inflation Factor (VIF) analysis: </a:t>
+            </a:r>
+          </a:p>
+          <a:p>
+            <a:pPr marL="457200" indent="-457200">
+              <a:buFont typeface="Arial" panose="020B0604020202020204" pitchFamily="34" charset="0"/>
+              <a:buChar char="•"/>
+            </a:pPr>
+            <a:r>
+              <a:rPr lang="en-US" sz="3200" dirty="0">
+                <a:latin typeface="Times New Roman" panose="02020603050405020304" pitchFamily="18" charset="0"/>
+                <a:cs typeface="Times New Roman" panose="02020603050405020304" pitchFamily="18" charset="0"/>
+              </a:rPr>
+              <a:t>Test for multicollinearity, which is when independent variables are highly correlated with each other. </a:t>
+            </a:r>
+          </a:p>
+          <a:p>
+            <a:pPr marL="457200" indent="-457200">
+              <a:buFont typeface="Arial" panose="020B0604020202020204" pitchFamily="34" charset="0"/>
+              <a:buChar char="•"/>
+            </a:pPr>
+            <a:r>
+              <a:rPr lang="en-US" sz="3200" dirty="0">
+                <a:latin typeface="Times New Roman" panose="02020603050405020304" pitchFamily="18" charset="0"/>
+                <a:cs typeface="Times New Roman" panose="02020603050405020304" pitchFamily="18" charset="0"/>
+              </a:rPr>
+              <a:t>If there is multicollinearity in the fixed effect model then the variables could be capturing overlapping aspects of economic status. </a:t>
+            </a:r>
+          </a:p>
+          <a:p>
+            <a:pPr marL="457200" indent="-457200">
+              <a:buFont typeface="Arial" panose="020B0604020202020204" pitchFamily="34" charset="0"/>
+              <a:buChar char="•"/>
+            </a:pPr>
             <a:endParaRPr lang="en-US" sz="3200" dirty="0">
               <a:latin typeface="Times New Roman" panose="02020603050405020304" pitchFamily="18" charset="0"/>
               <a:cs typeface="Times New Roman" panose="02020603050405020304" pitchFamily="18" charset="0"/>
             </a:endParaRPr>
-          </a:p>
-          <a:p>
-            <a:r>
-              <a:rPr lang="en-US" sz="3200" dirty="0">
-                <a:latin typeface="Times New Roman" panose="02020603050405020304" pitchFamily="18" charset="0"/>
-                <a:cs typeface="Times New Roman" panose="02020603050405020304" pitchFamily="18" charset="0"/>
-              </a:rPr>
-              <a:t>6 variables are chosen for the multivariable fixed effect model including: the number of vehicles owned, transit spending per capita, having internet access, number of hospitals, number of physicians, and poverty rate. </a:t>
-            </a:r>
-          </a:p>
-          <a:p>
-            <a:endParaRPr lang="en-US" sz="3200" dirty="0">
-              <a:latin typeface="Times New Roman" panose="02020603050405020304" pitchFamily="18" charset="0"/>
-              <a:cs typeface="Times New Roman" panose="02020603050405020304" pitchFamily="18" charset="0"/>
-            </a:endParaRPr>
-          </a:p>
-          <a:p>
-            <a:r>
-              <a:rPr lang="en-US" sz="3200" dirty="0">
-                <a:latin typeface="Times New Roman" panose="02020603050405020304" pitchFamily="18" charset="0"/>
-                <a:cs typeface="Times New Roman" panose="02020603050405020304" pitchFamily="18" charset="0"/>
-              </a:rPr>
-              <a:t>To evaluate the fit of the model, the R^2 represents how well the model explains variation within each fixed-effect group.</a:t>
-            </a:r>
-          </a:p>
-          <a:p>
-            <a:endParaRPr lang="en-US" sz="3200" dirty="0">
-              <a:latin typeface="Times New Roman" panose="02020603050405020304" pitchFamily="18" charset="0"/>
-              <a:cs typeface="Times New Roman" panose="02020603050405020304" pitchFamily="18" charset="0"/>
-            </a:endParaRPr>
-          </a:p>
-          <a:p>
-            <a:r>
-              <a:rPr lang="en-US" sz="3200" dirty="0">
-                <a:latin typeface="Times New Roman" panose="02020603050405020304" pitchFamily="18" charset="0"/>
-                <a:cs typeface="Times New Roman" panose="02020603050405020304" pitchFamily="18" charset="0"/>
-              </a:rPr>
-              <a:t>Variance Inflation Factor (VIF) analysis is used to test for multicollinearity, which is when independent variables are highly correlated with each other. If there is multicollinearity in the fixed effect model then the variables could be capturing overlapping aspects of economic status. </a:t>
-            </a:r>
           </a:p>
         </p:txBody>
       </p:sp>
@@ -3381,8 +3578,8 @@
         </p:nvSpPr>
         <p:spPr>
           <a:xfrm>
-            <a:off x="22345105" y="22040926"/>
-            <a:ext cx="16516895" cy="17974151"/>
+            <a:off x="22911586" y="20561587"/>
+            <a:ext cx="16060618" cy="11941731"/>
           </a:xfrm>
           <a:prstGeom prst="rect">
             <a:avLst/>
@@ -3411,138 +3608,235 @@
           </a:p>
           <a:p>
             <a:r>
-              <a:rPr lang="en-US" sz="3200" dirty="0">
+              <a:rPr lang="en-US" sz="3200" b="1" dirty="0">
                 <a:latin typeface="Times New Roman" panose="02020603050405020304" pitchFamily="18" charset="0"/>
                 <a:cs typeface="Times New Roman" panose="02020603050405020304" pitchFamily="18" charset="0"/>
               </a:rPr>
-              <a:t>When there is no fixed effect, the R^2 is 0.092 which suggests that the number of telehealth visits is explained little by the variables in this model. Fixed effect improves the model and R^2 is 0.139 so it explains more of the variation in the number of telehealth visits due to the independent variables.</a:t>
-            </a:r>
-          </a:p>
-          <a:p>
-            <a:endParaRPr lang="en-US" sz="3200" dirty="0">
+              <a:t>R^2</a:t>
+            </a:r>
+          </a:p>
+          <a:p>
+            <a:pPr marL="457200" indent="-457200">
+              <a:buFont typeface="Arial" panose="020B0604020202020204" pitchFamily="34" charset="0"/>
+              <a:buChar char="•"/>
+            </a:pPr>
+            <a:r>
+              <a:rPr lang="en-US" sz="2800" dirty="0">
+                <a:latin typeface="Times New Roman" panose="02020603050405020304" pitchFamily="18" charset="0"/>
+                <a:cs typeface="Times New Roman" panose="02020603050405020304" pitchFamily="18" charset="0"/>
+              </a:rPr>
+              <a:t>No fixed effect R^2 = 0.092. (Number of telehealth visits is explained little by the variables)</a:t>
+            </a:r>
+          </a:p>
+          <a:p>
+            <a:pPr marL="457200" indent="-457200">
+              <a:buFont typeface="Arial" panose="020B0604020202020204" pitchFamily="34" charset="0"/>
+              <a:buChar char="•"/>
+            </a:pPr>
+            <a:r>
+              <a:rPr lang="en-US" sz="2800" dirty="0">
+                <a:latin typeface="Times New Roman" panose="02020603050405020304" pitchFamily="18" charset="0"/>
+                <a:cs typeface="Times New Roman" panose="02020603050405020304" pitchFamily="18" charset="0"/>
+              </a:rPr>
+              <a:t>With fixed effect R^2 = 0.139 (Explains more of the variation)</a:t>
+            </a:r>
+          </a:p>
+          <a:p>
+            <a:pPr marL="457200" indent="-457200">
+              <a:buFont typeface="Arial" panose="020B0604020202020204" pitchFamily="34" charset="0"/>
+              <a:buChar char="•"/>
+            </a:pPr>
+            <a:endParaRPr lang="en-US" sz="2800" dirty="0">
               <a:latin typeface="Times New Roman" panose="02020603050405020304" pitchFamily="18" charset="0"/>
               <a:cs typeface="Times New Roman" panose="02020603050405020304" pitchFamily="18" charset="0"/>
             </a:endParaRPr>
           </a:p>
           <a:p>
-            <a:pPr marL="514350" indent="-514350">
-              <a:buAutoNum type="arabicPeriod"/>
-            </a:pPr>
-            <a:r>
-              <a:rPr lang="en-US" sz="3200" dirty="0">
+            <a:r>
+              <a:rPr lang="en-US" sz="3200" b="1" dirty="0">
                 <a:latin typeface="Times New Roman" panose="02020603050405020304" pitchFamily="18" charset="0"/>
                 <a:cs typeface="Times New Roman" panose="02020603050405020304" pitchFamily="18" charset="0"/>
               </a:rPr>
-              <a:t>Higher number of vehicles owned is associated with more telehealth visits. Individuals who own more vehicles have better financial status and more accessibility to resources needed for telehealth </a:t>
-            </a:r>
-          </a:p>
-          <a:p>
-            <a:pPr marL="514350" indent="-514350">
-              <a:buAutoNum type="arabicPeriod"/>
+              <a:t>Vehicles Owned</a:t>
+            </a:r>
+          </a:p>
+          <a:p>
+            <a:pPr marL="457200" indent="-457200">
+              <a:buFont typeface="Arial" panose="020B0604020202020204" pitchFamily="34" charset="0"/>
+              <a:buChar char="•"/>
             </a:pPr>
-            <a:endParaRPr lang="en-US" sz="3200" dirty="0">
+            <a:r>
+              <a:rPr lang="en-US" sz="2800" dirty="0">
+                <a:latin typeface="Times New Roman" panose="02020603050405020304" pitchFamily="18" charset="0"/>
+                <a:cs typeface="Times New Roman" panose="02020603050405020304" pitchFamily="18" charset="0"/>
+              </a:rPr>
+              <a:t>Higher number of vehicles owned is associated with more telehealth visits. </a:t>
+            </a:r>
+          </a:p>
+          <a:p>
+            <a:pPr marL="457200" indent="-457200">
+              <a:buFont typeface="Arial" panose="020B0604020202020204" pitchFamily="34" charset="0"/>
+              <a:buChar char="•"/>
+            </a:pPr>
+            <a:r>
+              <a:rPr lang="en-US" sz="2800" dirty="0">
+                <a:latin typeface="Times New Roman" panose="02020603050405020304" pitchFamily="18" charset="0"/>
+                <a:cs typeface="Times New Roman" panose="02020603050405020304" pitchFamily="18" charset="0"/>
+              </a:rPr>
+              <a:t>Likely better financial status and accessibility to resources</a:t>
+            </a:r>
+          </a:p>
+          <a:p>
+            <a:endParaRPr lang="en-US" sz="2800" dirty="0">
               <a:latin typeface="Times New Roman" panose="02020603050405020304" pitchFamily="18" charset="0"/>
               <a:cs typeface="Times New Roman" panose="02020603050405020304" pitchFamily="18" charset="0"/>
             </a:endParaRPr>
           </a:p>
           <a:p>
-            <a:pPr marL="514350" indent="-514350">
-              <a:buAutoNum type="arabicPeriod"/>
-            </a:pPr>
-            <a:r>
-              <a:rPr lang="en-US" sz="3200" dirty="0">
+            <a:r>
+              <a:rPr lang="en-US" sz="3200" b="1" dirty="0">
                 <a:latin typeface="Times New Roman" panose="02020603050405020304" pitchFamily="18" charset="0"/>
                 <a:cs typeface="Times New Roman" panose="02020603050405020304" pitchFamily="18" charset="0"/>
               </a:rPr>
-              <a:t>Transit Spending has a slight positive relationship after controlling for the fixed effects. A higher amount spent on transit is associated with a higher number of telehealth visits. Individuals who are using public transportation are likely living in urban areas. Urban areas which have greater access to high speed broad band internet compared to rural areas (Ching-Ching, 2018). </a:t>
-            </a:r>
-          </a:p>
-          <a:p>
-            <a:pPr marL="514350" indent="-514350">
-              <a:buAutoNum type="arabicPeriod"/>
+              <a:t>Transit Spending </a:t>
+            </a:r>
+          </a:p>
+          <a:p>
+            <a:pPr marL="457200" indent="-457200">
+              <a:buFont typeface="Arial" panose="020B0604020202020204" pitchFamily="34" charset="0"/>
+              <a:buChar char="•"/>
             </a:pPr>
-            <a:endParaRPr lang="en-US" sz="3200" dirty="0">
+            <a:r>
+              <a:rPr lang="en-US" sz="2800" dirty="0">
+                <a:latin typeface="Times New Roman" panose="02020603050405020304" pitchFamily="18" charset="0"/>
+                <a:cs typeface="Times New Roman" panose="02020603050405020304" pitchFamily="18" charset="0"/>
+              </a:rPr>
+              <a:t>Higher amount spent on transit is associated with more telehealth visits. </a:t>
+            </a:r>
+          </a:p>
+          <a:p>
+            <a:pPr marL="457200" indent="-457200">
+              <a:buFont typeface="Arial" panose="020B0604020202020204" pitchFamily="34" charset="0"/>
+              <a:buChar char="•"/>
+            </a:pPr>
+            <a:r>
+              <a:rPr lang="en-US" sz="2800" dirty="0">
+                <a:latin typeface="Times New Roman" panose="02020603050405020304" pitchFamily="18" charset="0"/>
+                <a:cs typeface="Times New Roman" panose="02020603050405020304" pitchFamily="18" charset="0"/>
+              </a:rPr>
+              <a:t>Likely urban areas which have greater access to high speed broad band internet compared to rural areas (Ching-Ching, 2018).</a:t>
+            </a:r>
+          </a:p>
+          <a:p>
+            <a:endParaRPr lang="en-US" sz="2800" dirty="0">
               <a:latin typeface="Times New Roman" panose="02020603050405020304" pitchFamily="18" charset="0"/>
               <a:cs typeface="Times New Roman" panose="02020603050405020304" pitchFamily="18" charset="0"/>
             </a:endParaRPr>
           </a:p>
           <a:p>
-            <a:pPr marL="514350" indent="-514350">
-              <a:buAutoNum type="arabicPeriod"/>
-            </a:pPr>
-            <a:r>
-              <a:rPr lang="en-US" sz="3200" dirty="0">
+            <a:r>
+              <a:rPr lang="en-US" sz="3200" b="1" dirty="0">
                 <a:latin typeface="Times New Roman" panose="02020603050405020304" pitchFamily="18" charset="0"/>
                 <a:cs typeface="Times New Roman" panose="02020603050405020304" pitchFamily="18" charset="0"/>
               </a:rPr>
-              <a:t>Internet access surprisingly shows a negative relationship to the number of telehealth visits. The Census Bureau’s American Community Survey finds that 95% of U.S. households have at least one type of computer (Liu, 2024). Given this widespread access, internet access alone is not a strong predictor of telehealth adoption because there could be other barriers could be present.</a:t>
-            </a:r>
-          </a:p>
-          <a:p>
-            <a:pPr marL="514350" indent="-514350">
-              <a:buAutoNum type="arabicPeriod"/>
+              <a:t>Internet access</a:t>
+            </a:r>
+          </a:p>
+          <a:p>
+            <a:pPr marL="457200" indent="-457200">
+              <a:buFont typeface="Arial" panose="020B0604020202020204" pitchFamily="34" charset="0"/>
+              <a:buChar char="•"/>
             </a:pPr>
-            <a:endParaRPr lang="en-US" sz="3200" dirty="0">
+            <a:r>
+              <a:rPr lang="en-US" sz="2800" dirty="0">
+                <a:latin typeface="Times New Roman" panose="02020603050405020304" pitchFamily="18" charset="0"/>
+                <a:cs typeface="Times New Roman" panose="02020603050405020304" pitchFamily="18" charset="0"/>
+              </a:rPr>
+              <a:t> Surprisingly more internet is associated with fewer telehealth visits. </a:t>
+            </a:r>
+          </a:p>
+          <a:p>
+            <a:pPr marL="457200" indent="-457200">
+              <a:buFont typeface="Arial" panose="020B0604020202020204" pitchFamily="34" charset="0"/>
+              <a:buChar char="•"/>
+            </a:pPr>
+            <a:r>
+              <a:rPr lang="en-US" sz="2800" dirty="0">
+                <a:latin typeface="Times New Roman" panose="02020603050405020304" pitchFamily="18" charset="0"/>
+                <a:cs typeface="Times New Roman" panose="02020603050405020304" pitchFamily="18" charset="0"/>
+              </a:rPr>
+              <a:t>Widespread access, 95% of U.S. households have at least one type of computer (Liu, 2024). </a:t>
+            </a:r>
+          </a:p>
+          <a:p>
+            <a:endParaRPr lang="en-US" sz="2800" dirty="0">
               <a:latin typeface="Times New Roman" panose="02020603050405020304" pitchFamily="18" charset="0"/>
               <a:cs typeface="Times New Roman" panose="02020603050405020304" pitchFamily="18" charset="0"/>
             </a:endParaRPr>
           </a:p>
           <a:p>
-            <a:pPr marL="514350" indent="-514350">
-              <a:buAutoNum type="arabicPeriod"/>
-            </a:pPr>
-            <a:r>
-              <a:rPr lang="en-US" sz="3200" dirty="0">
+            <a:r>
+              <a:rPr lang="en-US" sz="3200" b="1" dirty="0">
                 <a:latin typeface="Times New Roman" panose="02020603050405020304" pitchFamily="18" charset="0"/>
                 <a:cs typeface="Times New Roman" panose="02020603050405020304" pitchFamily="18" charset="0"/>
               </a:rPr>
-              <a:t>Very strong negative relationship between the number of hospitals and the number of telehealth visits because more availability of in person appointments. However, even with the presence of hospitals, routine checkups and follow ups have the potential to be done as a telehealth visit (Ashwood, 2017). </a:t>
-            </a:r>
-          </a:p>
-          <a:p>
-            <a:pPr marL="514350" indent="-514350">
-              <a:buAutoNum type="arabicPeriod"/>
+              <a:t>Number of Hospitals and Number of Providers</a:t>
+            </a:r>
+          </a:p>
+          <a:p>
+            <a:pPr marL="457200" indent="-457200">
+              <a:buFont typeface="Arial" panose="020B0604020202020204" pitchFamily="34" charset="0"/>
+              <a:buChar char="•"/>
             </a:pPr>
-            <a:endParaRPr lang="en-US" sz="3200" dirty="0">
+            <a:r>
+              <a:rPr lang="en-US" sz="2800" dirty="0">
+                <a:latin typeface="Times New Roman" panose="02020603050405020304" pitchFamily="18" charset="0"/>
+                <a:cs typeface="Times New Roman" panose="02020603050405020304" pitchFamily="18" charset="0"/>
+              </a:rPr>
+              <a:t>More hospitals is associated with less telehealth. (More in person availability but they have potential to be done as a telehealth visit (Ashwood, 2017). )</a:t>
+            </a:r>
+          </a:p>
+          <a:p>
+            <a:pPr marL="457200" indent="-457200">
+              <a:buFont typeface="Arial" panose="020B0604020202020204" pitchFamily="34" charset="0"/>
+              <a:buChar char="•"/>
+            </a:pPr>
+            <a:r>
+              <a:rPr lang="en-US" sz="2800" dirty="0">
+                <a:latin typeface="Times New Roman" panose="02020603050405020304" pitchFamily="18" charset="0"/>
+                <a:cs typeface="Times New Roman" panose="02020603050405020304" pitchFamily="18" charset="0"/>
+              </a:rPr>
+              <a:t>More providers is associated with more telehealth (More appointment availability)</a:t>
+            </a:r>
+          </a:p>
+          <a:p>
+            <a:endParaRPr lang="en-US" sz="2800" dirty="0">
               <a:latin typeface="Times New Roman" panose="02020603050405020304" pitchFamily="18" charset="0"/>
               <a:cs typeface="Times New Roman" panose="02020603050405020304" pitchFamily="18" charset="0"/>
             </a:endParaRPr>
           </a:p>
           <a:p>
-            <a:pPr marL="514350" indent="-514350">
-              <a:buAutoNum type="arabicPeriod"/>
-            </a:pPr>
-            <a:r>
-              <a:rPr lang="en-US" sz="3200" dirty="0">
+            <a:r>
+              <a:rPr lang="en-US" sz="3200" b="1" dirty="0">
                 <a:latin typeface="Times New Roman" panose="02020603050405020304" pitchFamily="18" charset="0"/>
                 <a:cs typeface="Times New Roman" panose="02020603050405020304" pitchFamily="18" charset="0"/>
               </a:rPr>
-              <a:t>In comparison, the relationship between the number of physicians and the number of telehealth visits becomes a much stronger positive which could be because when there are more physicians there is more appointment availability overall, including telehealth visits </a:t>
-            </a:r>
-          </a:p>
-          <a:p>
-            <a:pPr marL="514350" indent="-514350">
-              <a:buAutoNum type="arabicPeriod"/>
+              <a:t>Percent below poverty level </a:t>
+            </a:r>
+          </a:p>
+          <a:p>
+            <a:pPr marL="457200" indent="-457200">
+              <a:buFont typeface="Arial" panose="020B0604020202020204" pitchFamily="34" charset="0"/>
+              <a:buChar char="•"/>
             </a:pPr>
-            <a:endParaRPr lang="en-US" sz="3200" dirty="0">
-              <a:latin typeface="Times New Roman" panose="02020603050405020304" pitchFamily="18" charset="0"/>
-              <a:cs typeface="Times New Roman" panose="02020603050405020304" pitchFamily="18" charset="0"/>
-            </a:endParaRPr>
-          </a:p>
-          <a:p>
-            <a:pPr marL="514350" indent="-514350">
-              <a:buAutoNum type="arabicPeriod"/>
-            </a:pPr>
-            <a:r>
-              <a:rPr lang="en-US" sz="3200" dirty="0">
+            <a:r>
+              <a:rPr lang="en-US" sz="2800" dirty="0">
                 <a:latin typeface="Times New Roman" panose="02020603050405020304" pitchFamily="18" charset="0"/>
                 <a:cs typeface="Times New Roman" panose="02020603050405020304" pitchFamily="18" charset="0"/>
               </a:rPr>
-              <a:t>As percent below poverty level increase, there are fewer telehealth visits. This lack of access could be due to the restricted availability of resources needed for telehealth visits for low income.</a:t>
-            </a:r>
-          </a:p>
-          <a:p>
-            <a:endParaRPr lang="en-US" sz="3200" dirty="0">
+              <a:t>Higher poverty is associated with fewer telehealth visits</a:t>
+            </a:r>
+            <a:endParaRPr lang="en-US" sz="2800" dirty="0">
               <a:latin typeface="Times New Roman"/>
               <a:cs typeface="Times New Roman"/>
             </a:endParaRPr>
@@ -3558,7 +3852,7 @@
         <p:spPr>
           <a:xfrm>
             <a:off x="39628115" y="16209641"/>
-            <a:ext cx="10742415" cy="10033516"/>
+            <a:ext cx="10742415" cy="10095071"/>
           </a:xfrm>
           <a:prstGeom prst="rect">
             <a:avLst/>
@@ -3590,91 +3884,124 @@
             </a:r>
           </a:p>
           <a:p>
-            <a:endParaRPr lang="en-US" sz="4400" dirty="0"/>
-          </a:p>
-          <a:p>
-            <a:pPr algn="ctr"/>
-            <a:endParaRPr lang="en-US" sz="4400" dirty="0">
-              <a:latin typeface="Arial"/>
-              <a:cs typeface="Arial"/>
+            <a:pPr marL="457200" indent="-457200">
+              <a:buFont typeface="Arial" panose="020B0604020202020204" pitchFamily="34" charset="0"/>
+              <a:buChar char="•"/>
+            </a:pPr>
+            <a:r>
+              <a:rPr lang="en-US" sz="3200" dirty="0">
+                <a:latin typeface="Times New Roman" panose="02020603050405020304" pitchFamily="18" charset="0"/>
+                <a:cs typeface="Times New Roman" panose="02020603050405020304" pitchFamily="18" charset="0"/>
+              </a:rPr>
+              <a:t>There are eligible services which have the potential for increase access with the use of telehealth</a:t>
+            </a:r>
+          </a:p>
+          <a:p>
+            <a:pPr marL="457200" indent="-457200">
+              <a:buFont typeface="Arial" panose="020B0604020202020204" pitchFamily="34" charset="0"/>
+              <a:buChar char="•"/>
+            </a:pPr>
+            <a:endParaRPr lang="en-US" sz="3200" dirty="0">
+              <a:latin typeface="Times New Roman" panose="02020603050405020304" pitchFamily="18" charset="0"/>
+              <a:cs typeface="Times New Roman" panose="02020603050405020304" pitchFamily="18" charset="0"/>
             </a:endParaRPr>
           </a:p>
           <a:p>
-            <a:pPr algn="ctr"/>
-            <a:endParaRPr lang="en-US" sz="4400" dirty="0">
-              <a:latin typeface="Arial"/>
-              <a:cs typeface="Arial"/>
+            <a:pPr marL="457200" indent="-457200">
+              <a:buFont typeface="Arial" panose="020B0604020202020204" pitchFamily="34" charset="0"/>
+              <a:buChar char="•"/>
+            </a:pPr>
+            <a:r>
+              <a:rPr lang="en-US" sz="3200" dirty="0">
+                <a:latin typeface="Times New Roman" panose="02020603050405020304" pitchFamily="18" charset="0"/>
+                <a:cs typeface="Times New Roman" panose="02020603050405020304" pitchFamily="18" charset="0"/>
+              </a:rPr>
+              <a:t>Several key factors influencing telehealth usage have been identified in the fixed effect model</a:t>
+            </a:r>
+          </a:p>
+          <a:p>
+            <a:endParaRPr lang="en-US" sz="3200" dirty="0">
+              <a:latin typeface="Times New Roman" panose="02020603050405020304" pitchFamily="18" charset="0"/>
+              <a:cs typeface="Times New Roman" panose="02020603050405020304" pitchFamily="18" charset="0"/>
             </a:endParaRPr>
           </a:p>
           <a:p>
-            <a:pPr algn="ctr"/>
-            <a:endParaRPr lang="en-US" sz="4400" dirty="0">
-              <a:latin typeface="Arial"/>
-              <a:cs typeface="Arial"/>
+            <a:pPr marL="285750" indent="-285750">
+              <a:buFont typeface="Arial" panose="020B0604020202020204" pitchFamily="34" charset="0"/>
+              <a:buChar char="•"/>
+            </a:pPr>
+            <a:r>
+              <a:rPr lang="en-US" sz="3200" dirty="0">
+                <a:latin typeface="Times New Roman" panose="02020603050405020304" pitchFamily="18" charset="0"/>
+                <a:cs typeface="Times New Roman" panose="02020603050405020304" pitchFamily="18" charset="0"/>
+              </a:rPr>
+              <a:t>The use of telehealth by Medicare and Medicaid members is affected by more than just whether internet is available </a:t>
+            </a:r>
+          </a:p>
+          <a:p>
+            <a:pPr marL="285750" indent="-285750">
+              <a:buFont typeface="Arial" panose="020B0604020202020204" pitchFamily="34" charset="0"/>
+              <a:buChar char="•"/>
+            </a:pPr>
+            <a:endParaRPr lang="en-US" sz="3200" dirty="0">
+              <a:latin typeface="Times New Roman" panose="02020603050405020304" pitchFamily="18" charset="0"/>
+              <a:cs typeface="Times New Roman" panose="02020603050405020304" pitchFamily="18" charset="0"/>
             </a:endParaRPr>
           </a:p>
           <a:p>
-            <a:pPr algn="ctr"/>
-            <a:endParaRPr lang="en-US" sz="4400" dirty="0">
-              <a:latin typeface="Arial"/>
-              <a:cs typeface="Arial"/>
+            <a:pPr marL="285750" indent="-285750">
+              <a:buFont typeface="Arial" panose="020B0604020202020204" pitchFamily="34" charset="0"/>
+              <a:buChar char="•"/>
+            </a:pPr>
+            <a:r>
+              <a:rPr lang="en-US" sz="3200" dirty="0">
+                <a:latin typeface="Times New Roman" panose="02020603050405020304" pitchFamily="18" charset="0"/>
+                <a:cs typeface="Times New Roman" panose="02020603050405020304" pitchFamily="18" charset="0"/>
+              </a:rPr>
+              <a:t>There are many factors representing economic status, appointment access, and technology access</a:t>
+            </a:r>
+          </a:p>
+          <a:p>
+            <a:pPr marL="285750" indent="-285750">
+              <a:buFont typeface="Arial" panose="020B0604020202020204" pitchFamily="34" charset="0"/>
+              <a:buChar char="•"/>
+            </a:pPr>
+            <a:endParaRPr lang="en-US" sz="3200" dirty="0">
+              <a:latin typeface="Times New Roman" panose="02020603050405020304" pitchFamily="18" charset="0"/>
+              <a:cs typeface="Times New Roman" panose="02020603050405020304" pitchFamily="18" charset="0"/>
             </a:endParaRPr>
           </a:p>
           <a:p>
-            <a:pPr algn="ctr"/>
-            <a:endParaRPr lang="en-US" sz="4400" dirty="0">
-              <a:latin typeface="Arial"/>
-              <a:cs typeface="Arial"/>
+            <a:pPr marL="457200" indent="-457200">
+              <a:buFont typeface="Arial" panose="020B0604020202020204" pitchFamily="34" charset="0"/>
+              <a:buChar char="•"/>
+            </a:pPr>
+            <a:r>
+              <a:rPr lang="en-US" sz="3200" dirty="0">
+                <a:latin typeface="Times New Roman" panose="02020603050405020304" pitchFamily="18" charset="0"/>
+                <a:cs typeface="Times New Roman" panose="02020603050405020304" pitchFamily="18" charset="0"/>
+              </a:rPr>
+              <a:t>Medicare and Medicaid members in this study represents a population who is facing more economic and technological barriers </a:t>
+            </a:r>
+          </a:p>
+          <a:p>
+            <a:endParaRPr lang="en-US" sz="3200" dirty="0">
+              <a:latin typeface="Times New Roman" panose="02020603050405020304" pitchFamily="18" charset="0"/>
+              <a:cs typeface="Times New Roman" panose="02020603050405020304" pitchFamily="18" charset="0"/>
             </a:endParaRPr>
           </a:p>
           <a:p>
-            <a:pPr algn="ctr"/>
-            <a:endParaRPr lang="en-US" sz="4400" dirty="0">
-              <a:latin typeface="Arial"/>
-              <a:cs typeface="Arial"/>
-            </a:endParaRPr>
-          </a:p>
-          <a:p>
-            <a:pPr algn="ctr"/>
-            <a:endParaRPr lang="en-US" sz="4400" dirty="0">
-              <a:latin typeface="Arial"/>
-              <a:cs typeface="Arial"/>
-            </a:endParaRPr>
-          </a:p>
-          <a:p>
-            <a:pPr algn="ctr"/>
-            <a:endParaRPr lang="en-US" sz="4400" dirty="0">
-              <a:latin typeface="Arial"/>
-              <a:cs typeface="Arial"/>
-            </a:endParaRPr>
-          </a:p>
-          <a:p>
-            <a:pPr algn="ctr"/>
-            <a:endParaRPr lang="en-US" sz="4400" dirty="0">
-              <a:latin typeface="Arial"/>
-              <a:cs typeface="Arial"/>
-            </a:endParaRPr>
-          </a:p>
-          <a:p>
-            <a:pPr algn="ctr"/>
-            <a:endParaRPr lang="en-US" sz="4400" dirty="0">
-              <a:latin typeface="Arial"/>
-              <a:cs typeface="Arial"/>
-            </a:endParaRPr>
-          </a:p>
-          <a:p>
-            <a:pPr algn="ctr"/>
-            <a:endParaRPr lang="en-US" sz="4400" dirty="0">
-              <a:latin typeface="Arial"/>
-              <a:cs typeface="Arial"/>
-            </a:endParaRPr>
-          </a:p>
-          <a:p>
-            <a:pPr algn="ctr"/>
-            <a:endParaRPr lang="en-US" sz="4400" dirty="0">
-              <a:latin typeface="Arial"/>
-              <a:cs typeface="Arial"/>
-            </a:endParaRPr>
+            <a:pPr marL="457200" indent="-457200">
+              <a:buFont typeface="Arial" panose="020B0604020202020204" pitchFamily="34" charset="0"/>
+              <a:buChar char="•"/>
+            </a:pPr>
+            <a:r>
+              <a:rPr lang="en-US" sz="3200" dirty="0">
+                <a:latin typeface="Times New Roman" panose="02020603050405020304" pitchFamily="18" charset="0"/>
+                <a:cs typeface="Times New Roman" panose="02020603050405020304" pitchFamily="18" charset="0"/>
+              </a:rPr>
+              <a:t>Further research should be done on populations included other levels of insurance coverage.</a:t>
+            </a:r>
           </a:p>
         </p:txBody>
       </p:sp>
@@ -3795,7 +4122,7 @@
                 <a:latin typeface="Times New Roman" panose="02020603050405020304" pitchFamily="18" charset="0"/>
                 <a:ea typeface="Times New Roman" panose="02020603050405020304" pitchFamily="18" charset="0"/>
                 <a:cs typeface="Times New Roman" panose="02020603050405020304" pitchFamily="18" charset="0"/>
-                <a:hlinkClick r:id="rId3"/>
+                <a:hlinkClick r:id="rId2"/>
               </a:rPr>
               <a:t>https://doi.org/10.1377/hlthaff.2016.1130</a:t>
             </a:r>
@@ -3824,6 +4151,49 @@
                 <a:cs typeface="Times New Roman" panose="02020603050405020304" pitchFamily="18" charset="0"/>
               </a:rPr>
               <a:t>CMS Program Statistics - OEDA (2025). Medicare Telehealth Trends. [Data set]. Centers for Medicare &amp; Medicaid Services. </a:t>
+            </a:r>
+            <a:r>
+              <a:rPr lang="en-US" sz="2800" dirty="0">
+                <a:solidFill>
+                  <a:srgbClr val="1155CC"/>
+                </a:solidFill>
+                <a:effectLst/>
+                <a:latin typeface="Times New Roman" panose="02020603050405020304" pitchFamily="18" charset="0"/>
+                <a:ea typeface="Times New Roman" panose="02020603050405020304" pitchFamily="18" charset="0"/>
+                <a:cs typeface="Times New Roman" panose="02020603050405020304" pitchFamily="18" charset="0"/>
+                <a:hlinkClick r:id="rId3"/>
+              </a:rPr>
+              <a:t>https://catalog.data.gov/dataset/medicare-telemedicine-snapshot</a:t>
+            </a:r>
+            <a:r>
+              <a:rPr lang="en-US" sz="2800" dirty="0">
+                <a:effectLst/>
+                <a:latin typeface="Times New Roman" panose="02020603050405020304" pitchFamily="18" charset="0"/>
+                <a:ea typeface="Times New Roman" panose="02020603050405020304" pitchFamily="18" charset="0"/>
+                <a:cs typeface="Times New Roman" panose="02020603050405020304" pitchFamily="18" charset="0"/>
+              </a:rPr>
+              <a:t> </a:t>
+            </a:r>
+            <a:endParaRPr lang="en-US" sz="2800" dirty="0">
+              <a:latin typeface="Times New Roman" panose="02020603050405020304" pitchFamily="18" charset="0"/>
+              <a:cs typeface="Times New Roman" panose="02020603050405020304" pitchFamily="18" charset="0"/>
+            </a:endParaRPr>
+          </a:p>
+          <a:p>
+            <a:pPr marL="0" marR="0">
+              <a:buNone/>
+            </a:pPr>
+            <a:r>
+              <a:rPr lang="en-US" sz="2800" dirty="0">
+                <a:solidFill>
+                  <a:srgbClr val="000000"/>
+                </a:solidFill>
+                <a:effectLst/>
+                <a:latin typeface="Times New Roman" panose="02020603050405020304" pitchFamily="18" charset="0"/>
+                <a:ea typeface="Times New Roman" panose="02020603050405020304" pitchFamily="18" charset="0"/>
+                <a:cs typeface="Times New Roman" panose="02020603050405020304" pitchFamily="18" charset="0"/>
+              </a:rPr>
+              <a:t>Ching-Ching, Claire Lin et al.. (2018). Telehealth in health centers: Key adoption factors, barriers, and opportunities. Health Affairs, 37(12) </a:t>
             </a:r>
             <a:r>
               <a:rPr lang="en-US" sz="2800" dirty="0">
@@ -3836,49 +4206,6 @@
                 <a:cs typeface="Times New Roman" panose="02020603050405020304" pitchFamily="18" charset="0"/>
                 <a:hlinkClick r:id="rId4"/>
               </a:rPr>
-              <a:t>https://catalog.data.gov/dataset/medicare-telemedicine-snapshot</a:t>
-            </a:r>
-            <a:r>
-              <a:rPr lang="en-US" sz="2800" dirty="0">
-                <a:effectLst/>
-                <a:latin typeface="Times New Roman" panose="02020603050405020304" pitchFamily="18" charset="0"/>
-                <a:ea typeface="Times New Roman" panose="02020603050405020304" pitchFamily="18" charset="0"/>
-                <a:cs typeface="Times New Roman" panose="02020603050405020304" pitchFamily="18" charset="0"/>
-              </a:rPr>
-              <a:t> </a:t>
-            </a:r>
-            <a:endParaRPr lang="en-US" sz="2800" dirty="0">
-              <a:latin typeface="Times New Roman" panose="02020603050405020304" pitchFamily="18" charset="0"/>
-              <a:cs typeface="Times New Roman" panose="02020603050405020304" pitchFamily="18" charset="0"/>
-            </a:endParaRPr>
-          </a:p>
-          <a:p>
-            <a:pPr marL="0" marR="0">
-              <a:buNone/>
-            </a:pPr>
-            <a:r>
-              <a:rPr lang="en-US" sz="2800" dirty="0">
-                <a:solidFill>
-                  <a:srgbClr val="000000"/>
-                </a:solidFill>
-                <a:effectLst/>
-                <a:latin typeface="Times New Roman" panose="02020603050405020304" pitchFamily="18" charset="0"/>
-                <a:ea typeface="Times New Roman" panose="02020603050405020304" pitchFamily="18" charset="0"/>
-                <a:cs typeface="Times New Roman" panose="02020603050405020304" pitchFamily="18" charset="0"/>
-              </a:rPr>
-              <a:t>Ching-Ching, Claire Lin et al.. (2018). Telehealth in health centers: Key adoption factors, barriers, and opportunities. Health Affairs, 37(12) </a:t>
-            </a:r>
-            <a:r>
-              <a:rPr lang="en-US" sz="2800" dirty="0">
-                <a:solidFill>
-                  <a:srgbClr val="1155CC"/>
-                </a:solidFill>
-                <a:effectLst/>
-                <a:latin typeface="Times New Roman" panose="02020603050405020304" pitchFamily="18" charset="0"/>
-                <a:ea typeface="Times New Roman" panose="02020603050405020304" pitchFamily="18" charset="0"/>
-                <a:cs typeface="Times New Roman" panose="02020603050405020304" pitchFamily="18" charset="0"/>
-                <a:hlinkClick r:id="rId5"/>
-              </a:rPr>
               <a:t>https://doi.org/10.1377/hlthaff.2018.05125</a:t>
             </a:r>
             <a:endParaRPr lang="en-US" sz="2800" dirty="0">
@@ -3890,36 +4217,6 @@
           </a:p>
         </p:txBody>
       </p:sp>
-      <p:pic>
-        <p:nvPicPr>
-          <p:cNvPr id="10" name="Picture 9" descr="A red sign with white text&#10;&#10;AI-generated content may be incorrect.">
-            <a:extLst>
-              <a:ext uri="{FF2B5EF4-FFF2-40B4-BE49-F238E27FC236}">
-                <a16:creationId xmlns:a16="http://schemas.microsoft.com/office/drawing/2014/main" id="{5D142801-C073-53CF-2C31-6002BDC158DA}"/>
-              </a:ext>
-            </a:extLst>
-          </p:cNvPr>
-          <p:cNvPicPr>
-            <a:picLocks noChangeAspect="1"/>
-          </p:cNvPicPr>
-          <p:nvPr/>
-        </p:nvPicPr>
-        <p:blipFill>
-          <a:blip r:embed="rId6"/>
-          <a:stretch>
-            <a:fillRect/>
-          </a:stretch>
-        </p:blipFill>
-        <p:spPr>
-          <a:xfrm>
-            <a:off x="43190266" y="1403954"/>
-            <a:ext cx="6278239" cy="2050996"/>
-          </a:xfrm>
-          <a:prstGeom prst="rect">
-            <a:avLst/>
-          </a:prstGeom>
-        </p:spPr>
-      </p:pic>
       <p:pic>
         <p:nvPicPr>
           <p:cNvPr id="1026" name="Picture 8" descr="A graph of different colored squares&#10;&#10;AI-generated content may be incorrect.">
@@ -3935,7 +4232,7 @@
           <p:nvPr/>
         </p:nvPicPr>
         <p:blipFill>
-          <a:blip r:embed="rId7">
+          <a:blip r:embed="rId5">
             <a:extLst>
               <a:ext uri="{28A0092B-C50C-407E-A947-70E740481C1C}">
                 <a14:useLocalDpi xmlns:a14="http://schemas.microsoft.com/office/drawing/2010/main" val="0"/>
@@ -3949,8 +4246,8 @@
         </p:blipFill>
         <p:spPr bwMode="auto">
           <a:xfrm>
-            <a:off x="11594667" y="15432409"/>
-            <a:ext cx="10230695" cy="7082789"/>
+            <a:off x="11544976" y="14816203"/>
+            <a:ext cx="10719057" cy="7420886"/>
           </a:xfrm>
           <a:prstGeom prst="rect">
             <a:avLst/>
@@ -3987,7 +4284,7 @@
           <p:nvPr/>
         </p:nvPicPr>
         <p:blipFill>
-          <a:blip r:embed="rId8">
+          <a:blip r:embed="rId6">
             <a:extLst>
               <a:ext uri="{28A0092B-C50C-407E-A947-70E740481C1C}">
                 <a14:useLocalDpi xmlns:a14="http://schemas.microsoft.com/office/drawing/2010/main" val="0"/>
@@ -4001,8 +4298,8 @@
         </p:blipFill>
         <p:spPr bwMode="auto">
           <a:xfrm>
-            <a:off x="11594669" y="24552940"/>
-            <a:ext cx="10230694" cy="7134047"/>
+            <a:off x="11624888" y="24988128"/>
+            <a:ext cx="10696862" cy="7459114"/>
           </a:xfrm>
           <a:prstGeom prst="rect">
             <a:avLst/>
@@ -4040,13 +4337,15 @@
         </p:nvSpPr>
         <p:spPr bwMode="auto">
           <a:xfrm>
-            <a:off x="11594667" y="14290266"/>
-            <a:ext cx="10230695" cy="861774"/>
+            <a:off x="11481448" y="13300238"/>
+            <a:ext cx="10760390" cy="887534"/>
           </a:xfrm>
           <a:prstGeom prst="rect">
             <a:avLst/>
           </a:prstGeom>
-          <a:noFill/>
+          <a:solidFill>
+            <a:schemeClr val="bg1"/>
+          </a:solidFill>
           <a:ln w="9525">
             <a:solidFill>
               <a:schemeClr val="tx1"/>
@@ -4056,24 +4355,6 @@
             <a:tailEnd/>
           </a:ln>
           <a:effectLst/>
-          <a:extLst>
-            <a:ext uri="{909E8E84-426E-40DD-AFC4-6F175D3DCCD1}">
-              <a14:hiddenFill xmlns:a14="http://schemas.microsoft.com/office/drawing/2010/main">
-                <a:solidFill>
-                  <a:schemeClr val="accent1"/>
-                </a:solidFill>
-              </a14:hiddenFill>
-            </a:ext>
-            <a:ext uri="{AF507438-7753-43E0-B8FC-AC1667EBCBE1}">
-              <a14:hiddenEffects xmlns:a14="http://schemas.microsoft.com/office/drawing/2010/main">
-                <a:effectLst>
-                  <a:outerShdw dist="35921" dir="2700000" algn="ctr" rotWithShape="0">
-                    <a:schemeClr val="bg2"/>
-                  </a:outerShdw>
-                </a:effectLst>
-              </a14:hiddenEffects>
-            </a:ext>
-          </a:extLst>
         </p:spPr>
         <p:txBody>
           <a:bodyPr vert="horz" wrap="square" lIns="91440" tIns="45720" rIns="91440" bIns="45720" numCol="1" anchor="ctr" anchorCtr="0" compatLnSpc="1">
@@ -4170,13 +4451,15 @@
         </p:nvSpPr>
         <p:spPr bwMode="auto">
           <a:xfrm>
-            <a:off x="11594668" y="22949132"/>
-            <a:ext cx="10230695" cy="1354217"/>
+            <a:off x="11575197" y="23067445"/>
+            <a:ext cx="10680478" cy="1371218"/>
           </a:xfrm>
           <a:prstGeom prst="rect">
             <a:avLst/>
           </a:prstGeom>
-          <a:noFill/>
+          <a:solidFill>
+            <a:schemeClr val="bg1"/>
+          </a:solidFill>
           <a:ln w="9525">
             <a:solidFill>
               <a:schemeClr val="tx1"/>
@@ -4186,24 +4469,6 @@
             <a:tailEnd/>
           </a:ln>
           <a:effectLst/>
-          <a:extLst>
-            <a:ext uri="{909E8E84-426E-40DD-AFC4-6F175D3DCCD1}">
-              <a14:hiddenFill xmlns:a14="http://schemas.microsoft.com/office/drawing/2010/main">
-                <a:solidFill>
-                  <a:schemeClr val="accent1"/>
-                </a:solidFill>
-              </a14:hiddenFill>
-            </a:ext>
-            <a:ext uri="{AF507438-7753-43E0-B8FC-AC1667EBCBE1}">
-              <a14:hiddenEffects xmlns:a14="http://schemas.microsoft.com/office/drawing/2010/main">
-                <a:effectLst>
-                  <a:outerShdw dist="35921" dir="2700000" algn="ctr" rotWithShape="0">
-                    <a:schemeClr val="bg2"/>
-                  </a:outerShdw>
-                </a:effectLst>
-              </a14:hiddenEffects>
-            </a:ext>
-          </a:extLst>
         </p:spPr>
         <p:txBody>
           <a:bodyPr vert="horz" wrap="square" lIns="91440" tIns="45720" rIns="91440" bIns="45720" numCol="1" anchor="ctr" anchorCtr="0" compatLnSpc="1">
@@ -4404,14 +4669,14 @@
           <p:nvPr>
             <p:extLst>
               <p:ext uri="{D42A27DB-BD31-4B8C-83A1-F6EECF244321}">
-                <p14:modId xmlns:p14="http://schemas.microsoft.com/office/powerpoint/2010/main" val="817761805"/>
+                <p14:modId xmlns:p14="http://schemas.microsoft.com/office/powerpoint/2010/main" val="66633550"/>
               </p:ext>
             </p:extLst>
           </p:nvPr>
         </p:nvGraphicFramePr>
         <p:xfrm>
-          <a:off x="22455310" y="5872703"/>
-          <a:ext cx="16516894" cy="14327532"/>
+          <a:off x="22911586" y="5872704"/>
+          <a:ext cx="16060618" cy="13179359"/>
         </p:xfrm>
         <a:graphic>
           <a:graphicData uri="http://schemas.openxmlformats.org/drawingml/2006/table">
@@ -4420,28 +4685,28 @@
                 <a:tableStyleId>{5C22544A-7EE6-4342-B048-85BDC9FD1C3A}</a:tableStyleId>
               </a:tblPr>
               <a:tblGrid>
-                <a:gridCol w="4128339">
+                <a:gridCol w="4014294">
                   <a:extLst>
                     <a:ext uri="{9D8B030D-6E8A-4147-A177-3AD203B41FA5}">
                       <a16:colId xmlns:a16="http://schemas.microsoft.com/office/drawing/2014/main" val="3579134900"/>
                     </a:ext>
                   </a:extLst>
                 </a:gridCol>
-                <a:gridCol w="4128339">
+                <a:gridCol w="4014294">
                   <a:extLst>
                     <a:ext uri="{9D8B030D-6E8A-4147-A177-3AD203B41FA5}">
                       <a16:colId xmlns:a16="http://schemas.microsoft.com/office/drawing/2014/main" val="153221796"/>
                     </a:ext>
                   </a:extLst>
                 </a:gridCol>
-                <a:gridCol w="4130108">
+                <a:gridCol w="4016015">
                   <a:extLst>
                     <a:ext uri="{9D8B030D-6E8A-4147-A177-3AD203B41FA5}">
                       <a16:colId xmlns:a16="http://schemas.microsoft.com/office/drawing/2014/main" val="960077209"/>
                     </a:ext>
                   </a:extLst>
                 </a:gridCol>
-                <a:gridCol w="4130108">
+                <a:gridCol w="4016015">
                   <a:extLst>
                     <a:ext uri="{9D8B030D-6E8A-4147-A177-3AD203B41FA5}">
                       <a16:colId xmlns:a16="http://schemas.microsoft.com/office/drawing/2014/main" val="1505452983"/>
@@ -4449,7 +4714,7 @@
                   </a:extLst>
                 </a:gridCol>
               </a:tblGrid>
-              <a:tr h="981396">
+              <a:tr h="1038513">
                 <a:tc>
                   <a:txBody>
                     <a:bodyPr/>
@@ -4752,7 +5017,7 @@
                   </a:ext>
                 </a:extLst>
               </a:tr>
-              <a:tr h="684322">
+              <a:tr h="519256">
                 <a:tc>
                   <a:txBody>
                     <a:bodyPr/>
@@ -4820,7 +5085,9 @@
                       <a:headEnd type="none" w="med" len="med"/>
                       <a:tailEnd type="none" w="med" len="med"/>
                     </a:lnB>
-                    <a:noFill/>
+                    <a:solidFill>
+                      <a:schemeClr val="bg1"/>
+                    </a:solidFill>
                   </a:tcPr>
                 </a:tc>
                 <a:tc>
@@ -4899,7 +5166,9 @@
                       <a:headEnd type="none" w="med" len="med"/>
                       <a:tailEnd type="none" w="med" len="med"/>
                     </a:lnB>
-                    <a:noFill/>
+                    <a:solidFill>
+                      <a:schemeClr val="bg1"/>
+                    </a:solidFill>
                   </a:tcPr>
                 </a:tc>
                 <a:tc>
@@ -4975,7 +5244,9 @@
                       <a:headEnd type="none" w="med" len="med"/>
                       <a:tailEnd type="none" w="med" len="med"/>
                     </a:lnB>
-                    <a:noFill/>
+                    <a:solidFill>
+                      <a:schemeClr val="bg1"/>
+                    </a:solidFill>
                   </a:tcPr>
                 </a:tc>
                 <a:tc>
@@ -5051,7 +5322,9 @@
                       <a:headEnd type="none" w="med" len="med"/>
                       <a:tailEnd type="none" w="med" len="med"/>
                     </a:lnB>
-                    <a:noFill/>
+                    <a:solidFill>
+                      <a:schemeClr val="bg1"/>
+                    </a:solidFill>
                   </a:tcPr>
                 </a:tc>
                 <a:extLst>
@@ -5060,7 +5333,7 @@
                   </a:ext>
                 </a:extLst>
               </a:tr>
-              <a:tr h="831887">
+              <a:tr h="880302">
                 <a:tc>
                   <a:txBody>
                     <a:bodyPr/>
@@ -5128,7 +5401,9 @@
                       <a:headEnd type="none" w="med" len="med"/>
                       <a:tailEnd type="none" w="med" len="med"/>
                     </a:lnB>
-                    <a:noFill/>
+                    <a:solidFill>
+                      <a:schemeClr val="bg1"/>
+                    </a:solidFill>
                   </a:tcPr>
                 </a:tc>
                 <a:tc>
@@ -5204,7 +5479,9 @@
                       <a:headEnd type="none" w="med" len="med"/>
                       <a:tailEnd type="none" w="med" len="med"/>
                     </a:lnB>
-                    <a:noFill/>
+                    <a:solidFill>
+                      <a:schemeClr val="bg1"/>
+                    </a:solidFill>
                   </a:tcPr>
                 </a:tc>
                 <a:tc>
@@ -5280,7 +5557,9 @@
                       <a:headEnd type="none" w="med" len="med"/>
                       <a:tailEnd type="none" w="med" len="med"/>
                     </a:lnB>
-                    <a:noFill/>
+                    <a:solidFill>
+                      <a:schemeClr val="bg1"/>
+                    </a:solidFill>
                   </a:tcPr>
                 </a:tc>
                 <a:tc>
@@ -5356,7 +5635,9 @@
                       <a:headEnd type="none" w="med" len="med"/>
                       <a:tailEnd type="none" w="med" len="med"/>
                     </a:lnB>
-                    <a:noFill/>
+                    <a:solidFill>
+                      <a:schemeClr val="bg1"/>
+                    </a:solidFill>
                   </a:tcPr>
                 </a:tc>
                 <a:extLst>
@@ -5365,7 +5646,7 @@
                   </a:ext>
                 </a:extLst>
               </a:tr>
-              <a:tr h="1008977">
+              <a:tr h="1038513">
                 <a:tc>
                   <a:txBody>
                     <a:bodyPr/>
@@ -5439,7 +5720,9 @@
                       <a:headEnd type="none" w="med" len="med"/>
                       <a:tailEnd type="none" w="med" len="med"/>
                     </a:lnB>
-                    <a:noFill/>
+                    <a:solidFill>
+                      <a:schemeClr val="bg1"/>
+                    </a:solidFill>
                   </a:tcPr>
                 </a:tc>
                 <a:tc>
@@ -5515,7 +5798,9 @@
                       <a:headEnd type="none" w="med" len="med"/>
                       <a:tailEnd type="none" w="med" len="med"/>
                     </a:lnB>
-                    <a:noFill/>
+                    <a:solidFill>
+                      <a:schemeClr val="bg1"/>
+                    </a:solidFill>
                   </a:tcPr>
                 </a:tc>
                 <a:tc>
@@ -5591,7 +5876,9 @@
                       <a:headEnd type="none" w="med" len="med"/>
                       <a:tailEnd type="none" w="med" len="med"/>
                     </a:lnB>
-                    <a:noFill/>
+                    <a:solidFill>
+                      <a:schemeClr val="bg1"/>
+                    </a:solidFill>
                   </a:tcPr>
                 </a:tc>
                 <a:tc>
@@ -5667,7 +5954,9 @@
                       <a:headEnd type="none" w="med" len="med"/>
                       <a:tailEnd type="none" w="med" len="med"/>
                     </a:lnB>
-                    <a:noFill/>
+                    <a:solidFill>
+                      <a:schemeClr val="bg1"/>
+                    </a:solidFill>
                   </a:tcPr>
                 </a:tc>
                 <a:extLst>
@@ -5676,7 +5965,7 @@
                   </a:ext>
                 </a:extLst>
               </a:tr>
-              <a:tr h="831887">
+              <a:tr h="880302">
                 <a:tc>
                   <a:txBody>
                     <a:bodyPr/>
@@ -5744,7 +6033,9 @@
                       <a:headEnd type="none" w="med" len="med"/>
                       <a:tailEnd type="none" w="med" len="med"/>
                     </a:lnB>
-                    <a:noFill/>
+                    <a:solidFill>
+                      <a:schemeClr val="bg1"/>
+                    </a:solidFill>
                   </a:tcPr>
                 </a:tc>
                 <a:tc>
@@ -5820,7 +6111,9 @@
                       <a:headEnd type="none" w="med" len="med"/>
                       <a:tailEnd type="none" w="med" len="med"/>
                     </a:lnB>
-                    <a:noFill/>
+                    <a:solidFill>
+                      <a:schemeClr val="bg1"/>
+                    </a:solidFill>
                   </a:tcPr>
                 </a:tc>
                 <a:tc>
@@ -5896,7 +6189,9 @@
                       <a:headEnd type="none" w="med" len="med"/>
                       <a:tailEnd type="none" w="med" len="med"/>
                     </a:lnB>
-                    <a:noFill/>
+                    <a:solidFill>
+                      <a:schemeClr val="bg1"/>
+                    </a:solidFill>
                   </a:tcPr>
                 </a:tc>
                 <a:tc>
@@ -5972,7 +6267,9 @@
                       <a:headEnd type="none" w="med" len="med"/>
                       <a:tailEnd type="none" w="med" len="med"/>
                     </a:lnB>
-                    <a:noFill/>
+                    <a:solidFill>
+                      <a:schemeClr val="bg1"/>
+                    </a:solidFill>
                   </a:tcPr>
                 </a:tc>
                 <a:extLst>
@@ -5981,7 +6278,7 @@
                   </a:ext>
                 </a:extLst>
               </a:tr>
-              <a:tr h="756734">
+              <a:tr h="568984">
                 <a:tc>
                   <a:txBody>
                     <a:bodyPr/>
@@ -6055,7 +6352,9 @@
                       <a:headEnd type="none" w="med" len="med"/>
                       <a:tailEnd type="none" w="med" len="med"/>
                     </a:lnB>
-                    <a:noFill/>
+                    <a:solidFill>
+                      <a:schemeClr val="bg1"/>
+                    </a:solidFill>
                   </a:tcPr>
                 </a:tc>
                 <a:tc>
@@ -6081,7 +6380,7 @@
                           <a:latin typeface="Times New Roman" panose="02020603050405020304" pitchFamily="18" charset="0"/>
                           <a:cs typeface="Times New Roman" panose="02020603050405020304" pitchFamily="18" charset="0"/>
                         </a:rPr>
-                        <a:t>-0.072***</a:t>
+                        <a:t>-0.076***</a:t>
                       </a:r>
                       <a:endParaRPr lang="en-US" sz="3200" b="0" i="0" dirty="0">
                         <a:solidFill>
@@ -6131,7 +6430,9 @@
                       <a:headEnd type="none" w="med" len="med"/>
                       <a:tailEnd type="none" w="med" len="med"/>
                     </a:lnB>
-                    <a:noFill/>
+                    <a:solidFill>
+                      <a:schemeClr val="bg1"/>
+                    </a:solidFill>
                   </a:tcPr>
                 </a:tc>
                 <a:tc>
@@ -6207,7 +6508,9 @@
                       <a:headEnd type="none" w="med" len="med"/>
                       <a:tailEnd type="none" w="med" len="med"/>
                     </a:lnB>
-                    <a:noFill/>
+                    <a:solidFill>
+                      <a:schemeClr val="bg1"/>
+                    </a:solidFill>
                   </a:tcPr>
                 </a:tc>
                 <a:tc>
@@ -6283,7 +6586,9 @@
                       <a:headEnd type="none" w="med" len="med"/>
                       <a:tailEnd type="none" w="med" len="med"/>
                     </a:lnB>
-                    <a:noFill/>
+                    <a:solidFill>
+                      <a:schemeClr val="bg1"/>
+                    </a:solidFill>
                   </a:tcPr>
                 </a:tc>
                 <a:extLst>
@@ -6292,7 +6597,7 @@
                   </a:ext>
                 </a:extLst>
               </a:tr>
-              <a:tr h="831887">
+              <a:tr h="880302">
                 <a:tc>
                   <a:txBody>
                     <a:bodyPr/>
@@ -6360,7 +6665,9 @@
                       <a:headEnd type="none" w="med" len="med"/>
                       <a:tailEnd type="none" w="med" len="med"/>
                     </a:lnB>
-                    <a:noFill/>
+                    <a:solidFill>
+                      <a:schemeClr val="bg1"/>
+                    </a:solidFill>
                   </a:tcPr>
                 </a:tc>
                 <a:tc>
@@ -6436,7 +6743,9 @@
                       <a:headEnd type="none" w="med" len="med"/>
                       <a:tailEnd type="none" w="med" len="med"/>
                     </a:lnB>
-                    <a:noFill/>
+                    <a:solidFill>
+                      <a:schemeClr val="bg1"/>
+                    </a:solidFill>
                   </a:tcPr>
                 </a:tc>
                 <a:tc>
@@ -6512,7 +6821,9 @@
                       <a:headEnd type="none" w="med" len="med"/>
                       <a:tailEnd type="none" w="med" len="med"/>
                     </a:lnB>
-                    <a:noFill/>
+                    <a:solidFill>
+                      <a:schemeClr val="bg1"/>
+                    </a:solidFill>
                   </a:tcPr>
                 </a:tc>
                 <a:tc>
@@ -6588,7 +6899,9 @@
                       <a:headEnd type="none" w="med" len="med"/>
                       <a:tailEnd type="none" w="med" len="med"/>
                     </a:lnB>
-                    <a:noFill/>
+                    <a:solidFill>
+                      <a:schemeClr val="bg1"/>
+                    </a:solidFill>
                   </a:tcPr>
                 </a:tc>
                 <a:extLst>
@@ -6597,7 +6910,7 @@
                   </a:ext>
                 </a:extLst>
               </a:tr>
-              <a:tr h="1008977">
+              <a:tr h="758644">
                 <a:tc>
                   <a:txBody>
                     <a:bodyPr/>
@@ -6671,7 +6984,9 @@
                       <a:headEnd type="none" w="med" len="med"/>
                       <a:tailEnd type="none" w="med" len="med"/>
                     </a:lnB>
-                    <a:noFill/>
+                    <a:solidFill>
+                      <a:schemeClr val="bg1"/>
+                    </a:solidFill>
                   </a:tcPr>
                 </a:tc>
                 <a:tc>
@@ -6747,7 +7062,9 @@
                       <a:headEnd type="none" w="med" len="med"/>
                       <a:tailEnd type="none" w="med" len="med"/>
                     </a:lnB>
-                    <a:noFill/>
+                    <a:solidFill>
+                      <a:schemeClr val="bg1"/>
+                    </a:solidFill>
                   </a:tcPr>
                 </a:tc>
                 <a:tc>
@@ -6823,7 +7140,9 @@
                       <a:headEnd type="none" w="med" len="med"/>
                       <a:tailEnd type="none" w="med" len="med"/>
                     </a:lnB>
-                    <a:noFill/>
+                    <a:solidFill>
+                      <a:schemeClr val="bg1"/>
+                    </a:solidFill>
                   </a:tcPr>
                 </a:tc>
                 <a:tc>
@@ -6899,7 +7218,9 @@
                       <a:headEnd type="none" w="med" len="med"/>
                       <a:tailEnd type="none" w="med" len="med"/>
                     </a:lnB>
-                    <a:noFill/>
+                    <a:solidFill>
+                      <a:schemeClr val="bg1"/>
+                    </a:solidFill>
                   </a:tcPr>
                 </a:tc>
                 <a:extLst>
@@ -6908,7 +7229,7 @@
                   </a:ext>
                 </a:extLst>
               </a:tr>
-              <a:tr h="831887">
+              <a:tr h="880302">
                 <a:tc>
                   <a:txBody>
                     <a:bodyPr/>
@@ -6976,7 +7297,9 @@
                       <a:headEnd type="none" w="med" len="med"/>
                       <a:tailEnd type="none" w="med" len="med"/>
                     </a:lnB>
-                    <a:noFill/>
+                    <a:solidFill>
+                      <a:schemeClr val="bg1"/>
+                    </a:solidFill>
                   </a:tcPr>
                 </a:tc>
                 <a:tc>
@@ -7052,7 +7375,9 @@
                       <a:headEnd type="none" w="med" len="med"/>
                       <a:tailEnd type="none" w="med" len="med"/>
                     </a:lnB>
-                    <a:noFill/>
+                    <a:solidFill>
+                      <a:schemeClr val="bg1"/>
+                    </a:solidFill>
                   </a:tcPr>
                 </a:tc>
                 <a:tc>
@@ -7128,7 +7453,9 @@
                       <a:headEnd type="none" w="med" len="med"/>
                       <a:tailEnd type="none" w="med" len="med"/>
                     </a:lnB>
-                    <a:noFill/>
+                    <a:solidFill>
+                      <a:schemeClr val="bg1"/>
+                    </a:solidFill>
                   </a:tcPr>
                 </a:tc>
                 <a:tc>
@@ -7204,7 +7531,9 @@
                       <a:headEnd type="none" w="med" len="med"/>
                       <a:tailEnd type="none" w="med" len="med"/>
                     </a:lnB>
-                    <a:noFill/>
+                    <a:solidFill>
+                      <a:schemeClr val="bg1"/>
+                    </a:solidFill>
                   </a:tcPr>
                 </a:tc>
                 <a:extLst>
@@ -7213,7 +7542,7 @@
                   </a:ext>
                 </a:extLst>
               </a:tr>
-              <a:tr h="1008977">
+              <a:tr h="758644">
                 <a:tc>
                   <a:txBody>
                     <a:bodyPr/>
@@ -7287,7 +7616,9 @@
                       <a:headEnd type="none" w="med" len="med"/>
                       <a:tailEnd type="none" w="med" len="med"/>
                     </a:lnB>
-                    <a:noFill/>
+                    <a:solidFill>
+                      <a:schemeClr val="bg1"/>
+                    </a:solidFill>
                   </a:tcPr>
                 </a:tc>
                 <a:tc>
@@ -7363,7 +7694,9 @@
                       <a:headEnd type="none" w="med" len="med"/>
                       <a:tailEnd type="none" w="med" len="med"/>
                     </a:lnB>
-                    <a:noFill/>
+                    <a:solidFill>
+                      <a:schemeClr val="bg1"/>
+                    </a:solidFill>
                   </a:tcPr>
                 </a:tc>
                 <a:tc>
@@ -7439,7 +7772,9 @@
                       <a:headEnd type="none" w="med" len="med"/>
                       <a:tailEnd type="none" w="med" len="med"/>
                     </a:lnB>
-                    <a:noFill/>
+                    <a:solidFill>
+                      <a:schemeClr val="bg1"/>
+                    </a:solidFill>
                   </a:tcPr>
                 </a:tc>
                 <a:tc>
@@ -7515,7 +7850,9 @@
                       <a:headEnd type="none" w="med" len="med"/>
                       <a:tailEnd type="none" w="med" len="med"/>
                     </a:lnB>
-                    <a:noFill/>
+                    <a:solidFill>
+                      <a:schemeClr val="bg1"/>
+                    </a:solidFill>
                   </a:tcPr>
                 </a:tc>
                 <a:extLst>
@@ -7524,7 +7861,7 @@
                   </a:ext>
                 </a:extLst>
               </a:tr>
-              <a:tr h="831887">
+              <a:tr h="880302">
                 <a:tc>
                   <a:txBody>
                     <a:bodyPr/>
@@ -7592,7 +7929,9 @@
                       <a:headEnd type="none" w="med" len="med"/>
                       <a:tailEnd type="none" w="med" len="med"/>
                     </a:lnB>
-                    <a:noFill/>
+                    <a:solidFill>
+                      <a:schemeClr val="bg1"/>
+                    </a:solidFill>
                   </a:tcPr>
                 </a:tc>
                 <a:tc>
@@ -7671,7 +8010,9 @@
                       <a:headEnd type="none" w="med" len="med"/>
                       <a:tailEnd type="none" w="med" len="med"/>
                     </a:lnB>
-                    <a:noFill/>
+                    <a:solidFill>
+                      <a:schemeClr val="bg1"/>
+                    </a:solidFill>
                   </a:tcPr>
                 </a:tc>
                 <a:tc>
@@ -7747,7 +8088,9 @@
                       <a:headEnd type="none" w="med" len="med"/>
                       <a:tailEnd type="none" w="med" len="med"/>
                     </a:lnB>
-                    <a:noFill/>
+                    <a:solidFill>
+                      <a:schemeClr val="bg1"/>
+                    </a:solidFill>
                   </a:tcPr>
                 </a:tc>
                 <a:tc>
@@ -7823,7 +8166,9 @@
                       <a:headEnd type="none" w="med" len="med"/>
                       <a:tailEnd type="none" w="med" len="med"/>
                     </a:lnB>
-                    <a:noFill/>
+                    <a:solidFill>
+                      <a:schemeClr val="bg1"/>
+                    </a:solidFill>
                   </a:tcPr>
                 </a:tc>
                 <a:extLst>
@@ -7832,7 +8177,7 @@
                   </a:ext>
                 </a:extLst>
               </a:tr>
-              <a:tr h="1008977">
+              <a:tr h="1038513">
                 <a:tc>
                   <a:txBody>
                     <a:bodyPr/>
@@ -7906,7 +8251,9 @@
                       <a:headEnd type="none" w="med" len="med"/>
                       <a:tailEnd type="none" w="med" len="med"/>
                     </a:lnB>
-                    <a:noFill/>
+                    <a:solidFill>
+                      <a:schemeClr val="bg1"/>
+                    </a:solidFill>
                   </a:tcPr>
                 </a:tc>
                 <a:tc>
@@ -7982,7 +8329,9 @@
                       <a:headEnd type="none" w="med" len="med"/>
                       <a:tailEnd type="none" w="med" len="med"/>
                     </a:lnB>
-                    <a:noFill/>
+                    <a:solidFill>
+                      <a:schemeClr val="bg1"/>
+                    </a:solidFill>
                   </a:tcPr>
                 </a:tc>
                 <a:tc>
@@ -8058,7 +8407,9 @@
                       <a:headEnd type="none" w="med" len="med"/>
                       <a:tailEnd type="none" w="med" len="med"/>
                     </a:lnB>
-                    <a:noFill/>
+                    <a:solidFill>
+                      <a:schemeClr val="bg1"/>
+                    </a:solidFill>
                   </a:tcPr>
                 </a:tc>
                 <a:tc>
@@ -8134,7 +8485,9 @@
                       <a:headEnd type="none" w="med" len="med"/>
                       <a:tailEnd type="none" w="med" len="med"/>
                     </a:lnB>
-                    <a:noFill/>
+                    <a:solidFill>
+                      <a:schemeClr val="bg1"/>
+                    </a:solidFill>
                   </a:tcPr>
                 </a:tc>
                 <a:extLst>
@@ -8143,7 +8496,7 @@
                   </a:ext>
                 </a:extLst>
               </a:tr>
-              <a:tr h="831887">
+              <a:tr h="880302">
                 <a:tc>
                   <a:txBody>
                     <a:bodyPr/>
@@ -8220,7 +8573,9 @@
                       <a:headEnd type="none" w="med" len="med"/>
                       <a:tailEnd type="none" w="med" len="med"/>
                     </a:lnB>
-                    <a:noFill/>
+                    <a:solidFill>
+                      <a:schemeClr val="bg1"/>
+                    </a:solidFill>
                   </a:tcPr>
                 </a:tc>
                 <a:tc>
@@ -8296,7 +8651,9 @@
                       <a:headEnd type="none" w="med" len="med"/>
                       <a:tailEnd type="none" w="med" len="med"/>
                     </a:lnB>
-                    <a:noFill/>
+                    <a:solidFill>
+                      <a:schemeClr val="bg1"/>
+                    </a:solidFill>
                   </a:tcPr>
                 </a:tc>
                 <a:tc>
@@ -8372,7 +8729,9 @@
                       <a:headEnd type="none" w="med" len="med"/>
                       <a:tailEnd type="none" w="med" len="med"/>
                     </a:lnB>
-                    <a:noFill/>
+                    <a:solidFill>
+                      <a:schemeClr val="bg1"/>
+                    </a:solidFill>
                   </a:tcPr>
                 </a:tc>
                 <a:tc>
@@ -8448,7 +8807,9 @@
                       <a:headEnd type="none" w="med" len="med"/>
                       <a:tailEnd type="none" w="med" len="med"/>
                     </a:lnB>
-                    <a:noFill/>
+                    <a:solidFill>
+                      <a:schemeClr val="bg1"/>
+                    </a:solidFill>
                   </a:tcPr>
                 </a:tc>
                 <a:extLst>
@@ -8457,7 +8818,7 @@
                   </a:ext>
                 </a:extLst>
               </a:tr>
-              <a:tr h="682191">
+              <a:tr h="519256">
                 <a:tc>
                   <a:txBody>
                     <a:bodyPr/>
@@ -8534,7 +8895,9 @@
                       <a:headEnd type="none" w="med" len="med"/>
                       <a:tailEnd type="none" w="med" len="med"/>
                     </a:lnB>
-                    <a:noFill/>
+                    <a:solidFill>
+                      <a:schemeClr val="bg1"/>
+                    </a:solidFill>
                   </a:tcPr>
                 </a:tc>
                 <a:tc>
@@ -8610,7 +8973,9 @@
                       <a:headEnd type="none" w="med" len="med"/>
                       <a:tailEnd type="none" w="med" len="med"/>
                     </a:lnB>
-                    <a:noFill/>
+                    <a:solidFill>
+                      <a:schemeClr val="bg1"/>
+                    </a:solidFill>
                   </a:tcPr>
                 </a:tc>
                 <a:tc>
@@ -8686,7 +9051,9 @@
                       <a:headEnd type="none" w="med" len="med"/>
                       <a:tailEnd type="none" w="med" len="med"/>
                     </a:lnB>
-                    <a:noFill/>
+                    <a:solidFill>
+                      <a:schemeClr val="bg1"/>
+                    </a:solidFill>
                   </a:tcPr>
                 </a:tc>
                 <a:tc>
@@ -8762,7 +9129,9 @@
                       <a:headEnd type="none" w="med" len="med"/>
                       <a:tailEnd type="none" w="med" len="med"/>
                     </a:lnB>
-                    <a:noFill/>
+                    <a:solidFill>
+                      <a:schemeClr val="bg1"/>
+                    </a:solidFill>
                   </a:tcPr>
                 </a:tc>
                 <a:extLst>
@@ -8771,7 +9140,7 @@
                   </a:ext>
                 </a:extLst>
               </a:tr>
-              <a:tr h="756734">
+              <a:tr h="568984">
                 <a:tc>
                   <a:txBody>
                     <a:bodyPr/>
@@ -8845,7 +9214,9 @@
                       <a:headEnd type="none" w="med" len="med"/>
                       <a:tailEnd type="none" w="med" len="med"/>
                     </a:lnB>
-                    <a:noFill/>
+                    <a:solidFill>
+                      <a:schemeClr val="bg1"/>
+                    </a:solidFill>
                   </a:tcPr>
                 </a:tc>
                 <a:tc>
@@ -8921,7 +9292,9 @@
                       <a:headEnd type="none" w="med" len="med"/>
                       <a:tailEnd type="none" w="med" len="med"/>
                     </a:lnB>
-                    <a:noFill/>
+                    <a:solidFill>
+                      <a:schemeClr val="bg1"/>
+                    </a:solidFill>
                   </a:tcPr>
                 </a:tc>
                 <a:tc>
@@ -8997,7 +9370,9 @@
                       <a:headEnd type="none" w="med" len="med"/>
                       <a:tailEnd type="none" w="med" len="med"/>
                     </a:lnB>
-                    <a:noFill/>
+                    <a:solidFill>
+                      <a:schemeClr val="bg1"/>
+                    </a:solidFill>
                   </a:tcPr>
                 </a:tc>
                 <a:tc>
@@ -9073,7 +9448,9 @@
                       <a:headEnd type="none" w="med" len="med"/>
                       <a:tailEnd type="none" w="med" len="med"/>
                     </a:lnB>
-                    <a:noFill/>
+                    <a:solidFill>
+                      <a:schemeClr val="bg1"/>
+                    </a:solidFill>
                   </a:tcPr>
                 </a:tc>
                 <a:extLst>
@@ -9082,7 +9459,7 @@
                   </a:ext>
                 </a:extLst>
               </a:tr>
-              <a:tr h="756734">
+              <a:tr h="568984">
                 <a:tc>
                   <a:txBody>
                     <a:bodyPr/>
@@ -9156,7 +9533,9 @@
                       <a:headEnd type="none" w="med" len="med"/>
                       <a:tailEnd type="none" w="med" len="med"/>
                     </a:lnB>
-                    <a:noFill/>
+                    <a:solidFill>
+                      <a:schemeClr val="bg1"/>
+                    </a:solidFill>
                   </a:tcPr>
                 </a:tc>
                 <a:tc>
@@ -9232,7 +9611,9 @@
                       <a:headEnd type="none" w="med" len="med"/>
                       <a:tailEnd type="none" w="med" len="med"/>
                     </a:lnB>
-                    <a:noFill/>
+                    <a:solidFill>
+                      <a:schemeClr val="bg1"/>
+                    </a:solidFill>
                   </a:tcPr>
                 </a:tc>
                 <a:tc>
@@ -9308,7 +9689,9 @@
                       <a:headEnd type="none" w="med" len="med"/>
                       <a:tailEnd type="none" w="med" len="med"/>
                     </a:lnB>
-                    <a:noFill/>
+                    <a:solidFill>
+                      <a:schemeClr val="bg1"/>
+                    </a:solidFill>
                   </a:tcPr>
                 </a:tc>
                 <a:tc>
@@ -9384,7 +9767,9 @@
                       <a:headEnd type="none" w="med" len="med"/>
                       <a:tailEnd type="none" w="med" len="med"/>
                     </a:lnB>
-                    <a:noFill/>
+                    <a:solidFill>
+                      <a:schemeClr val="bg1"/>
+                    </a:solidFill>
                   </a:tcPr>
                 </a:tc>
                 <a:extLst>
@@ -9393,7 +9778,7 @@
                   </a:ext>
                 </a:extLst>
               </a:tr>
-              <a:tr h="682191">
+              <a:tr h="519256">
                 <a:tc>
                   <a:txBody>
                     <a:bodyPr/>
@@ -9470,7 +9855,9 @@
                       <a:headEnd type="none" w="med" len="med"/>
                       <a:tailEnd type="none" w="med" len="med"/>
                     </a:lnB>
-                    <a:noFill/>
+                    <a:solidFill>
+                      <a:schemeClr val="bg1"/>
+                    </a:solidFill>
                   </a:tcPr>
                 </a:tc>
                 <a:tc>
@@ -9546,7 +9933,9 @@
                       <a:headEnd type="none" w="med" len="med"/>
                       <a:tailEnd type="none" w="med" len="med"/>
                     </a:lnB>
-                    <a:noFill/>
+                    <a:solidFill>
+                      <a:schemeClr val="bg1"/>
+                    </a:solidFill>
                   </a:tcPr>
                 </a:tc>
                 <a:tc>
@@ -9622,7 +10011,9 @@
                       <a:headEnd type="none" w="med" len="med"/>
                       <a:tailEnd type="none" w="med" len="med"/>
                     </a:lnB>
-                    <a:noFill/>
+                    <a:solidFill>
+                      <a:schemeClr val="bg1"/>
+                    </a:solidFill>
                   </a:tcPr>
                 </a:tc>
                 <a:tc>
@@ -9698,7 +10089,9 @@
                       <a:headEnd type="none" w="med" len="med"/>
                       <a:tailEnd type="none" w="med" len="med"/>
                     </a:lnB>
-                    <a:noFill/>
+                    <a:solidFill>
+                      <a:schemeClr val="bg1"/>
+                    </a:solidFill>
                   </a:tcPr>
                 </a:tc>
                 <a:extLst>
@@ -9727,13 +10120,15 @@
         </p:nvSpPr>
         <p:spPr bwMode="auto">
           <a:xfrm>
-            <a:off x="22455312" y="4577922"/>
-            <a:ext cx="16516894" cy="1077218"/>
+            <a:off x="22911586" y="4577922"/>
+            <a:ext cx="16060620" cy="1077218"/>
           </a:xfrm>
           <a:prstGeom prst="rect">
             <a:avLst/>
           </a:prstGeom>
-          <a:noFill/>
+          <a:solidFill>
+            <a:schemeClr val="bg1"/>
+          </a:solidFill>
           <a:ln>
             <a:solidFill>
               <a:schemeClr val="tx1"/>
@@ -9751,9 +10146,6 @@
           <a:lstStyle/>
           <a:p>
             <a:pPr marL="0" marR="0" lvl="0" indent="457200" algn="ctr" defTabSz="914400" rtl="0" eaLnBrk="0" fontAlgn="base" latinLnBrk="0" hangingPunct="0">
-              <a:lnSpc>
-                <a:spcPct val="100000"/>
-              </a:lnSpc>
               <a:spcBef>
                 <a:spcPct val="0"/>
               </a:spcBef>
@@ -9809,13 +10201,15 @@
         </p:nvSpPr>
         <p:spPr>
           <a:xfrm>
-            <a:off x="22455311" y="20467103"/>
-            <a:ext cx="16516895" cy="1077218"/>
+            <a:off x="22840032" y="19329771"/>
+            <a:ext cx="16132172" cy="954107"/>
           </a:xfrm>
           <a:prstGeom prst="rect">
             <a:avLst/>
           </a:prstGeom>
-          <a:noFill/>
+          <a:solidFill>
+            <a:schemeClr val="bg1"/>
+          </a:solidFill>
           <a:ln>
             <a:solidFill>
               <a:schemeClr val="tx1"/>
@@ -9830,7 +10224,7 @@
           <a:p>
             <a:pPr marL="0" marR="0"/>
             <a:r>
-              <a:rPr lang="en-US" sz="3200" b="1" dirty="0">
+              <a:rPr lang="en-US" sz="2800" b="1" dirty="0">
                 <a:effectLst/>
                 <a:latin typeface="Times New Roman" panose="02020603050405020304" pitchFamily="18" charset="0"/>
                 <a:ea typeface="Times New Roman" panose="02020603050405020304" pitchFamily="18" charset="0"/>
@@ -9839,7 +10233,7 @@
               <a:t>Note:</a:t>
             </a:r>
             <a:r>
-              <a:rPr lang="en-US" sz="3200" dirty="0">
+              <a:rPr lang="en-US" sz="2800" dirty="0">
                 <a:effectLst/>
                 <a:latin typeface="Times New Roman" panose="02020603050405020304" pitchFamily="18" charset="0"/>
                 <a:ea typeface="Times New Roman" panose="02020603050405020304" pitchFamily="18" charset="0"/>
@@ -9865,7 +10259,7 @@
         <p:spPr>
           <a:xfrm>
             <a:off x="11594670" y="4668868"/>
-            <a:ext cx="10230695" cy="9356408"/>
+            <a:ext cx="10535811" cy="8082430"/>
           </a:xfrm>
           <a:prstGeom prst="rect">
             <a:avLst/>
@@ -9921,10 +10315,14 @@
                 <a:ea typeface="Times New Roman" panose="02020603050405020304" pitchFamily="18" charset="0"/>
                 <a:cs typeface="Times New Roman" panose="02020603050405020304" pitchFamily="18" charset="0"/>
               </a:rPr>
-              <a:t> shows the number of telehealth services was the highest in 2020, likely because the pandemic forced almost all in person visits to become virtual. </a:t>
-            </a:r>
-          </a:p>
-          <a:p>
+              <a:t> shows the number of telehealth services was the highest in 2020 because the pandemic forced almost all in person visits to become virtual. </a:t>
+            </a:r>
+          </a:p>
+          <a:p>
+            <a:pPr marL="457200" indent="-457200">
+              <a:buFont typeface="Arial" panose="020B0604020202020204" pitchFamily="34" charset="0"/>
+              <a:buChar char="•"/>
+            </a:pPr>
             <a:endParaRPr lang="en-US" altLang="en-US" sz="3200" dirty="0">
               <a:latin typeface="Times New Roman" panose="02020603050405020304" pitchFamily="18" charset="0"/>
               <a:ea typeface="Times New Roman" panose="02020603050405020304" pitchFamily="18" charset="0"/>
@@ -9933,22 +10331,7 @@
           </a:p>
           <a:p>
             <a:r>
-              <a:rPr kumimoji="0" lang="en-US" altLang="en-US" sz="3200" b="0" i="0" u="none" strike="noStrike" cap="none" normalizeH="0" baseline="0" dirty="0">
-                <a:ln>
-                  <a:noFill/>
-                </a:ln>
-                <a:solidFill>
-                  <a:schemeClr val="tx1"/>
-                </a:solidFill>
-                <a:effectLst/>
-                <a:latin typeface="Times New Roman" panose="02020603050405020304" pitchFamily="18" charset="0"/>
-                <a:ea typeface="Times New Roman" panose="02020603050405020304" pitchFamily="18" charset="0"/>
-                <a:cs typeface="Times New Roman" panose="02020603050405020304" pitchFamily="18" charset="0"/>
-              </a:rPr>
-              <a:t>However, </a:t>
-            </a:r>
-            <a:r>
-              <a:rPr kumimoji="0" lang="en-US" altLang="en-US" sz="3200" b="1" i="1" u="none" strike="noStrike" cap="none" normalizeH="0" baseline="0" dirty="0">
+              <a:rPr kumimoji="0" lang="en-US" altLang="en-US" sz="3200" b="1" u="none" strike="noStrike" cap="none" normalizeH="0" baseline="0" dirty="0">
                 <a:ln>
                   <a:noFill/>
                 </a:ln>
@@ -9999,7 +10382,76 @@
                 <a:ea typeface="Times New Roman" panose="02020603050405020304" pitchFamily="18" charset="0"/>
                 <a:cs typeface="Times New Roman" panose="02020603050405020304" pitchFamily="18" charset="0"/>
               </a:rPr>
-              <a:t>Therefore, this research will provide insight into ways that the use of telehealth services can increase and which populations are currently </a:t>
+              <a:t>This research will provide insight into:</a:t>
+            </a:r>
+          </a:p>
+          <a:p>
+            <a:endParaRPr kumimoji="0" lang="en-US" altLang="en-US" sz="3200" b="0" i="0" u="none" strike="noStrike" cap="none" normalizeH="0" baseline="0" dirty="0">
+              <a:ln>
+                <a:noFill/>
+              </a:ln>
+              <a:solidFill>
+                <a:schemeClr val="tx1"/>
+              </a:solidFill>
+              <a:effectLst/>
+              <a:latin typeface="Times New Roman" panose="02020603050405020304" pitchFamily="18" charset="0"/>
+              <a:ea typeface="Times New Roman" panose="02020603050405020304" pitchFamily="18" charset="0"/>
+              <a:cs typeface="Times New Roman" panose="02020603050405020304" pitchFamily="18" charset="0"/>
+            </a:endParaRPr>
+          </a:p>
+          <a:p>
+            <a:pPr marL="457200" indent="-457200">
+              <a:buFont typeface="Arial" panose="020B0604020202020204" pitchFamily="34" charset="0"/>
+              <a:buChar char="•"/>
+            </a:pPr>
+            <a:r>
+              <a:rPr lang="en-US" altLang="en-US" sz="3200" dirty="0">
+                <a:latin typeface="Times New Roman" panose="02020603050405020304" pitchFamily="18" charset="0"/>
+                <a:ea typeface="Times New Roman" panose="02020603050405020304" pitchFamily="18" charset="0"/>
+                <a:cs typeface="Times New Roman" panose="02020603050405020304" pitchFamily="18" charset="0"/>
+              </a:rPr>
+              <a:t>The </a:t>
+            </a:r>
+            <a:r>
+              <a:rPr kumimoji="0" lang="en-US" altLang="en-US" sz="3200" b="0" i="0" u="none" strike="noStrike" cap="none" normalizeH="0" baseline="0" dirty="0">
+                <a:ln>
+                  <a:noFill/>
+                </a:ln>
+                <a:solidFill>
+                  <a:schemeClr val="tx1"/>
+                </a:solidFill>
+                <a:effectLst/>
+                <a:latin typeface="Times New Roman" panose="02020603050405020304" pitchFamily="18" charset="0"/>
+                <a:ea typeface="Times New Roman" panose="02020603050405020304" pitchFamily="18" charset="0"/>
+                <a:cs typeface="Times New Roman" panose="02020603050405020304" pitchFamily="18" charset="0"/>
+              </a:rPr>
+              <a:t>ways that the use of telehealth services can increase </a:t>
+            </a:r>
+            <a:endParaRPr lang="en-US" altLang="en-US" sz="3200" dirty="0">
+              <a:latin typeface="Times New Roman" panose="02020603050405020304" pitchFamily="18" charset="0"/>
+              <a:ea typeface="Times New Roman" panose="02020603050405020304" pitchFamily="18" charset="0"/>
+              <a:cs typeface="Times New Roman" panose="02020603050405020304" pitchFamily="18" charset="0"/>
+            </a:endParaRPr>
+          </a:p>
+          <a:p>
+            <a:pPr marL="457200" indent="-457200">
+              <a:buFont typeface="Arial" panose="020B0604020202020204" pitchFamily="34" charset="0"/>
+              <a:buChar char="•"/>
+            </a:pPr>
+            <a:r>
+              <a:rPr kumimoji="0" lang="en-US" altLang="en-US" sz="3200" b="0" i="0" u="none" strike="noStrike" cap="none" normalizeH="0" baseline="0" dirty="0">
+                <a:ln>
+                  <a:noFill/>
+                </a:ln>
+                <a:solidFill>
+                  <a:schemeClr val="tx1"/>
+                </a:solidFill>
+                <a:effectLst/>
+                <a:latin typeface="Times New Roman" panose="02020603050405020304" pitchFamily="18" charset="0"/>
+                <a:ea typeface="Times New Roman" panose="02020603050405020304" pitchFamily="18" charset="0"/>
+                <a:cs typeface="Times New Roman" panose="02020603050405020304" pitchFamily="18" charset="0"/>
+              </a:rPr>
+              <a:t>Which populations are currently </a:t>
             </a:r>
             <a:r>
               <a:rPr lang="en-US" altLang="en-US" sz="3200" dirty="0">
@@ -10021,18 +10473,6 @@
               <a:latin typeface="Times New Roman" panose="02020603050405020304" pitchFamily="18" charset="0"/>
               <a:cs typeface="Times New Roman" panose="02020603050405020304" pitchFamily="18" charset="0"/>
             </a:endParaRPr>
-          </a:p>
-          <a:p>
-            <a:endParaRPr lang="en-US" sz="2800" dirty="0">
-              <a:latin typeface="Arial" panose="020B0604020202020204" pitchFamily="34" charset="0"/>
-              <a:cs typeface="Arial" panose="020B0604020202020204" pitchFamily="34" charset="0"/>
-            </a:endParaRPr>
-          </a:p>
-          <a:p>
-            <a:endParaRPr lang="en-US" sz="4400" dirty="0"/>
-          </a:p>
-          <a:p>
-            <a:endParaRPr lang="en-US" sz="4400" dirty="0"/>
           </a:p>
         </p:txBody>
       </p:sp>
@@ -10052,13 +10492,15 @@
         </p:nvSpPr>
         <p:spPr bwMode="auto">
           <a:xfrm>
-            <a:off x="39394585" y="4608699"/>
+            <a:off x="39280611" y="4621998"/>
             <a:ext cx="11089919" cy="1015663"/>
           </a:xfrm>
           <a:prstGeom prst="rect">
             <a:avLst/>
           </a:prstGeom>
-          <a:noFill/>
+          <a:solidFill>
+            <a:schemeClr val="bg1"/>
+          </a:solidFill>
           <a:ln>
             <a:solidFill>
               <a:schemeClr val="tx1"/>
@@ -10143,7 +10585,7 @@
           <p:nvPr>
             <p:extLst>
               <p:ext uri="{D42A27DB-BD31-4B8C-83A1-F6EECF244321}">
-                <p14:modId xmlns:p14="http://schemas.microsoft.com/office/powerpoint/2010/main" val="3782720034"/>
+                <p14:modId xmlns:p14="http://schemas.microsoft.com/office/powerpoint/2010/main" val="1858810530"/>
               </p:ext>
             </p:extLst>
           </p:nvPr>
@@ -10409,7 +10851,9 @@
                       <a:headEnd type="none" w="med" len="med"/>
                       <a:tailEnd type="none" w="med" len="med"/>
                     </a:lnB>
-                    <a:noFill/>
+                    <a:solidFill>
+                      <a:schemeClr val="bg1"/>
+                    </a:solidFill>
                   </a:tcPr>
                 </a:tc>
                 <a:tc>
@@ -10485,7 +10929,9 @@
                       <a:headEnd type="none" w="med" len="med"/>
                       <a:tailEnd type="none" w="med" len="med"/>
                     </a:lnB>
-                    <a:noFill/>
+                    <a:solidFill>
+                      <a:schemeClr val="bg1"/>
+                    </a:solidFill>
                   </a:tcPr>
                 </a:tc>
                 <a:extLst>
@@ -10565,7 +11011,9 @@
                       <a:headEnd type="none" w="med" len="med"/>
                       <a:tailEnd type="none" w="med" len="med"/>
                     </a:lnB>
-                    <a:noFill/>
+                    <a:solidFill>
+                      <a:schemeClr val="bg1"/>
+                    </a:solidFill>
                   </a:tcPr>
                 </a:tc>
                 <a:tc>
@@ -10641,7 +11089,9 @@
                       <a:headEnd type="none" w="med" len="med"/>
                       <a:tailEnd type="none" w="med" len="med"/>
                     </a:lnB>
-                    <a:noFill/>
+                    <a:solidFill>
+                      <a:schemeClr val="bg1"/>
+                    </a:solidFill>
                   </a:tcPr>
                 </a:tc>
                 <a:extLst>
@@ -10721,7 +11171,9 @@
                       <a:headEnd type="none" w="med" len="med"/>
                       <a:tailEnd type="none" w="med" len="med"/>
                     </a:lnB>
-                    <a:noFill/>
+                    <a:solidFill>
+                      <a:schemeClr val="bg1"/>
+                    </a:solidFill>
                   </a:tcPr>
                 </a:tc>
                 <a:tc>
@@ -10797,7 +11249,9 @@
                       <a:headEnd type="none" w="med" len="med"/>
                       <a:tailEnd type="none" w="med" len="med"/>
                     </a:lnB>
-                    <a:noFill/>
+                    <a:solidFill>
+                      <a:schemeClr val="bg1"/>
+                    </a:solidFill>
                   </a:tcPr>
                 </a:tc>
                 <a:extLst>
@@ -10880,7 +11334,9 @@
                       <a:headEnd type="none" w="med" len="med"/>
                       <a:tailEnd type="none" w="med" len="med"/>
                     </a:lnB>
-                    <a:noFill/>
+                    <a:solidFill>
+                      <a:schemeClr val="bg1"/>
+                    </a:solidFill>
                   </a:tcPr>
                 </a:tc>
                 <a:tc>
@@ -10956,7 +11412,9 @@
                       <a:headEnd type="none" w="med" len="med"/>
                       <a:tailEnd type="none" w="med" len="med"/>
                     </a:lnB>
-                    <a:noFill/>
+                    <a:solidFill>
+                      <a:schemeClr val="bg1"/>
+                    </a:solidFill>
                   </a:tcPr>
                 </a:tc>
                 <a:extLst>
@@ -11039,7 +11497,9 @@
                       <a:headEnd type="none" w="med" len="med"/>
                       <a:tailEnd type="none" w="med" len="med"/>
                     </a:lnB>
-                    <a:noFill/>
+                    <a:solidFill>
+                      <a:schemeClr val="bg1"/>
+                    </a:solidFill>
                   </a:tcPr>
                 </a:tc>
                 <a:tc>
@@ -11115,7 +11575,9 @@
                       <a:headEnd type="none" w="med" len="med"/>
                       <a:tailEnd type="none" w="med" len="med"/>
                     </a:lnB>
-                    <a:noFill/>
+                    <a:solidFill>
+                      <a:schemeClr val="bg1"/>
+                    </a:solidFill>
                   </a:tcPr>
                 </a:tc>
                 <a:extLst>
@@ -11198,7 +11660,9 @@
                       <a:headEnd type="none" w="med" len="med"/>
                       <a:tailEnd type="none" w="med" len="med"/>
                     </a:lnB>
-                    <a:noFill/>
+                    <a:solidFill>
+                      <a:schemeClr val="bg1"/>
+                    </a:solidFill>
                   </a:tcPr>
                 </a:tc>
                 <a:tc>
@@ -11274,7 +11738,9 @@
                       <a:headEnd type="none" w="med" len="med"/>
                       <a:tailEnd type="none" w="med" len="med"/>
                     </a:lnB>
-                    <a:noFill/>
+                    <a:solidFill>
+                      <a:schemeClr val="bg1"/>
+                    </a:solidFill>
                   </a:tcPr>
                 </a:tc>
                 <a:extLst>
@@ -11302,7 +11768,7 @@
         <p:spPr>
           <a:xfrm>
             <a:off x="39619757" y="12519415"/>
-            <a:ext cx="10742415" cy="3200876"/>
+            <a:ext cx="10878583" cy="3200876"/>
           </a:xfrm>
           <a:prstGeom prst="rect">
             <a:avLst/>
@@ -11334,6 +11800,18 @@
             </a:r>
           </a:p>
           <a:p>
+            <a:pPr marL="457200" indent="-457200">
+              <a:buFont typeface="Arial" panose="020B0604020202020204" pitchFamily="34" charset="0"/>
+              <a:buChar char="•"/>
+            </a:pPr>
+            <a:r>
+              <a:rPr lang="en-US" sz="3200" dirty="0">
+                <a:latin typeface="Times New Roman" panose="02020603050405020304" pitchFamily="18" charset="0"/>
+                <a:ea typeface="Times New Roman" panose="02020603050405020304" pitchFamily="18" charset="0"/>
+                <a:cs typeface="Times New Roman" panose="02020603050405020304" pitchFamily="18" charset="0"/>
+              </a:rPr>
+              <a:t>&lt;</a:t>
+            </a:r>
             <a:r>
               <a:rPr lang="en-US" sz="3200" dirty="0">
                 <a:effectLst/>
@@ -11341,24 +11819,60 @@
                 <a:ea typeface="Times New Roman" panose="02020603050405020304" pitchFamily="18" charset="0"/>
                 <a:cs typeface="Times New Roman" panose="02020603050405020304" pitchFamily="18" charset="0"/>
               </a:rPr>
-              <a:t>A VIF below 5 suggests low multicollinearity which is better for a multivariate fixed effect </a:t>
+              <a:t>5 suggests low multicollinearity </a:t>
+            </a:r>
+          </a:p>
+          <a:p>
+            <a:pPr marL="457200" indent="-457200">
+              <a:buFont typeface="Arial" panose="020B0604020202020204" pitchFamily="34" charset="0"/>
+              <a:buChar char="•"/>
+            </a:pPr>
+            <a:r>
+              <a:rPr lang="en-US" sz="3200" dirty="0">
+                <a:latin typeface="Times New Roman" panose="02020603050405020304" pitchFamily="18" charset="0"/>
+                <a:ea typeface="Times New Roman" panose="02020603050405020304" pitchFamily="18" charset="0"/>
+                <a:cs typeface="Times New Roman" panose="02020603050405020304" pitchFamily="18" charset="0"/>
+              </a:rPr>
+              <a:t>Which is b</a:t>
+            </a:r>
+            <a:r>
+              <a:rPr lang="en-US" sz="3200" dirty="0">
+                <a:effectLst/>
+                <a:latin typeface="Times New Roman" panose="02020603050405020304" pitchFamily="18" charset="0"/>
+                <a:ea typeface="Times New Roman" panose="02020603050405020304" pitchFamily="18" charset="0"/>
+                <a:cs typeface="Times New Roman" panose="02020603050405020304" pitchFamily="18" charset="0"/>
+              </a:rPr>
+              <a:t>etter for a multivariate fixed effect </a:t>
             </a:r>
             <a:r>
               <a:rPr lang="en-US" sz="3200" dirty="0">
                 <a:latin typeface="Times New Roman" panose="02020603050405020304" pitchFamily="18" charset="0"/>
                 <a:cs typeface="Times New Roman" panose="02020603050405020304" pitchFamily="18" charset="0"/>
               </a:rPr>
-              <a:t>model. The variables in Table 2 are all low supporting that the coefficients in the fixed effect are more accurate and reliable.</a:t>
+              <a:t>model</a:t>
+            </a:r>
+          </a:p>
+          <a:p>
+            <a:pPr marL="457200" indent="-457200">
+              <a:buFont typeface="Arial" panose="020B0604020202020204" pitchFamily="34" charset="0"/>
+              <a:buChar char="•"/>
+            </a:pPr>
+            <a:r>
+              <a:rPr lang="en-US" sz="3200" dirty="0">
+                <a:latin typeface="Times New Roman" panose="02020603050405020304" pitchFamily="18" charset="0"/>
+                <a:cs typeface="Times New Roman" panose="02020603050405020304" pitchFamily="18" charset="0"/>
+              </a:rPr>
+              <a:t>Table 2 variables are mostly low so coefficients in the Fixed Effect are accurate and reliable.</a:t>
             </a:r>
           </a:p>
         </p:txBody>
       </p:sp>
       <p:pic>
         <p:nvPicPr>
-          <p:cNvPr id="44" name="Picture 43" descr="A red sign with white text&#10;&#10;AI-generated content may be incorrect.">
+          <p:cNvPr id="47" name="Picture 46" descr="A red sign with white letters&#10;&#10;AI-generated content may be incorrect.">
             <a:extLst>
               <a:ext uri="{FF2B5EF4-FFF2-40B4-BE49-F238E27FC236}">
-                <a16:creationId xmlns:a16="http://schemas.microsoft.com/office/drawing/2014/main" id="{6686F00C-7B28-BED0-EFE4-3CC76EEB4ECA}"/>
+                <a16:creationId xmlns:a16="http://schemas.microsoft.com/office/drawing/2014/main" id="{31B164D4-EFD8-1410-8BAD-6F0D431412CC}"/>
               </a:ext>
             </a:extLst>
           </p:cNvPr>
@@ -11368,15 +11882,45 @@
           <p:nvPr/>
         </p:nvPicPr>
         <p:blipFill>
-          <a:blip r:embed="rId6"/>
+          <a:blip r:embed="rId7"/>
           <a:stretch>
             <a:fillRect/>
           </a:stretch>
         </p:blipFill>
         <p:spPr>
           <a:xfrm>
-            <a:off x="1737895" y="1299287"/>
-            <a:ext cx="6278239" cy="2050996"/>
+            <a:off x="1535253" y="1299287"/>
+            <a:ext cx="6584181" cy="2194727"/>
+          </a:xfrm>
+          <a:prstGeom prst="rect">
+            <a:avLst/>
+          </a:prstGeom>
+        </p:spPr>
+      </p:pic>
+      <p:pic>
+        <p:nvPicPr>
+          <p:cNvPr id="48" name="Picture 47" descr="A red sign with white letters&#10;&#10;AI-generated content may be incorrect.">
+            <a:extLst>
+              <a:ext uri="{FF2B5EF4-FFF2-40B4-BE49-F238E27FC236}">
+                <a16:creationId xmlns:a16="http://schemas.microsoft.com/office/drawing/2014/main" id="{CD3F1D51-0902-0E22-B72A-F23D5F75A250}"/>
+              </a:ext>
+            </a:extLst>
+          </p:cNvPr>
+          <p:cNvPicPr>
+            <a:picLocks noChangeAspect="1"/>
+          </p:cNvPicPr>
+          <p:nvPr/>
+        </p:nvPicPr>
+        <p:blipFill>
+          <a:blip r:embed="rId7"/>
+          <a:stretch>
+            <a:fillRect/>
+          </a:stretch>
+        </p:blipFill>
+        <p:spPr>
+          <a:xfrm>
+            <a:off x="43235046" y="1332088"/>
+            <a:ext cx="6584181" cy="2194727"/>
           </a:xfrm>
           <a:prstGeom prst="rect">
             <a:avLst/>
@@ -11388,11 +11932,6 @@
   <p:clrMapOvr>
     <a:masterClrMapping/>
   </p:clrMapOvr>
-  <p:extLst>
-    <p:ext uri="{6950BFC3-D8DA-4A85-94F7-54DA5524770B}">
-      <p188:commentRel xmlns:p188="http://schemas.microsoft.com/office/powerpoint/2018/8/main" r:id="rId2"/>
-    </p:ext>
-  </p:extLst>
 </p:sld>
 </file>
 

</xml_diff>

<commit_message>
Adding vis to poster
</commit_message>
<xml_diff>
--- a/Final Paper and Presentation/Poster Presentation.pptx
+++ b/Final Paper and Presentation/Poster Presentation.pptx
@@ -3571,7 +3571,7 @@
         <p:spPr>
           <a:xfrm>
             <a:off x="905935" y="4292231"/>
-            <a:ext cx="9444683" cy="13049726"/>
+            <a:ext cx="9444683" cy="14034611"/>
           </a:xfrm>
           <a:prstGeom prst="rect">
             <a:avLst/>
@@ -3706,7 +3706,7 @@
                 <a:latin typeface="Times New Roman"/>
                 <a:cs typeface="Times New Roman"/>
               </a:rPr>
-              <a:t> Assesses the relationship between the variables and the number of telehealth visits (per capita).</a:t>
+              <a:t>Assesses the relationship between the variables and the number of telehealth visits (per capita).</a:t>
             </a:r>
           </a:p>
           <a:p>
@@ -3767,6 +3767,58 @@
               <a:buFont typeface="Arial" panose="020B0604020202020204" pitchFamily="34" charset="0"/>
               <a:buChar char="•"/>
             </a:pPr>
+            <a:r>
+              <a:rPr kumimoji="0" lang="en-US" altLang="en-US" sz="3200" b="0" i="0" u="none" strike="noStrike" cap="none" normalizeH="0" baseline="0" dirty="0">
+                <a:ln>
+                  <a:noFill/>
+                </a:ln>
+                <a:solidFill>
+                  <a:schemeClr val="tx1"/>
+                </a:solidFill>
+                <a:effectLst/>
+                <a:latin typeface="Times New Roman" panose="02020603050405020304" pitchFamily="18" charset="0"/>
+                <a:ea typeface="Times New Roman" panose="02020603050405020304" pitchFamily="18" charset="0"/>
+                <a:cs typeface="Times New Roman" panose="02020603050405020304" pitchFamily="18" charset="0"/>
+              </a:rPr>
+              <a:t>Increasing the use of telehealth services</a:t>
+            </a:r>
+            <a:r>
+              <a:rPr lang="en-US" altLang="en-US" sz="3200" dirty="0">
+                <a:latin typeface="Times New Roman" panose="02020603050405020304" pitchFamily="18" charset="0"/>
+                <a:ea typeface="Times New Roman" panose="02020603050405020304" pitchFamily="18" charset="0"/>
+                <a:cs typeface="Times New Roman" panose="02020603050405020304" pitchFamily="18" charset="0"/>
+              </a:rPr>
+              <a:t> for </a:t>
+            </a:r>
+            <a:r>
+              <a:rPr kumimoji="0" lang="en-US" altLang="en-US" sz="3200" b="0" i="0" u="none" strike="noStrike" cap="none" normalizeH="0" baseline="0" dirty="0">
+                <a:ln>
+                  <a:noFill/>
+                </a:ln>
+                <a:solidFill>
+                  <a:schemeClr val="tx1"/>
+                </a:solidFill>
+                <a:effectLst/>
+                <a:latin typeface="Times New Roman" panose="02020603050405020304" pitchFamily="18" charset="0"/>
+                <a:ea typeface="Times New Roman" panose="02020603050405020304" pitchFamily="18" charset="0"/>
+                <a:cs typeface="Times New Roman" panose="02020603050405020304" pitchFamily="18" charset="0"/>
+              </a:rPr>
+              <a:t>populations who are </a:t>
+            </a:r>
+            <a:r>
+              <a:rPr lang="en-US" altLang="en-US" sz="3200" dirty="0">
+                <a:latin typeface="Times New Roman" panose="02020603050405020304" pitchFamily="18" charset="0"/>
+                <a:cs typeface="Times New Roman" panose="02020603050405020304" pitchFamily="18" charset="0"/>
+              </a:rPr>
+              <a:t>lacking </a:t>
+            </a:r>
+            <a:r>
+              <a:rPr lang="en-US" sz="3200" dirty="0">
+                <a:latin typeface="Times New Roman" panose="02020603050405020304" pitchFamily="18" charset="0"/>
+                <a:cs typeface="Times New Roman" panose="02020603050405020304" pitchFamily="18" charset="0"/>
+              </a:rPr>
+              <a:t>vs accessing eligible services.</a:t>
+            </a:r>
             <a:endParaRPr lang="en-US" sz="3200" dirty="0">
               <a:latin typeface="Times New Roman"/>
               <a:cs typeface="Times New Roman"/>
@@ -3782,8 +3834,8 @@
         </p:nvSpPr>
         <p:spPr>
           <a:xfrm>
-            <a:off x="876982" y="17933943"/>
-            <a:ext cx="9444683" cy="14157722"/>
+            <a:off x="879903" y="18762659"/>
+            <a:ext cx="9536883" cy="13337724"/>
           </a:xfrm>
           <a:prstGeom prst="rect">
             <a:avLst/>
@@ -3962,7 +4014,21 @@
                 <a:latin typeface="Times New Roman" panose="02020603050405020304" pitchFamily="18" charset="0"/>
                 <a:cs typeface="Times New Roman" panose="02020603050405020304" pitchFamily="18" charset="0"/>
               </a:rPr>
-              <a:t>R^2 represents how well the model explains variation in number of telehealth visits for each fixed-effect group.</a:t>
+              <a:t>R</a:t>
+            </a:r>
+            <a:r>
+              <a:rPr lang="en-US" sz="3200" baseline="30000" dirty="0">
+                <a:latin typeface="Times New Roman" panose="02020603050405020304" pitchFamily="18" charset="0"/>
+                <a:cs typeface="Times New Roman" panose="02020603050405020304" pitchFamily="18" charset="0"/>
+              </a:rPr>
+              <a:t>2</a:t>
+            </a:r>
+            <a:r>
+              <a:rPr lang="en-US" sz="3200" dirty="0">
+                <a:latin typeface="Times New Roman" panose="02020603050405020304" pitchFamily="18" charset="0"/>
+                <a:cs typeface="Times New Roman" panose="02020603050405020304" pitchFamily="18" charset="0"/>
+              </a:rPr>
+              <a:t> represents how well the model explains variation in number of telehealth visits for each fixed-effect group.</a:t>
             </a:r>
           </a:p>
           <a:p>
@@ -4017,26 +4083,6 @@
               </a:rPr>
               <a:t>If so, variables could be capturing overlapping aspects of economic status. </a:t>
             </a:r>
-          </a:p>
-          <a:p>
-            <a:pPr marL="457200" indent="-457200">
-              <a:buFont typeface="Arial" panose="020B0604020202020204" pitchFamily="34" charset="0"/>
-              <a:buChar char="•"/>
-            </a:pPr>
-            <a:endParaRPr lang="en-US" sz="3400" dirty="0">
-              <a:latin typeface="Times New Roman" panose="02020603050405020304" pitchFamily="18" charset="0"/>
-              <a:cs typeface="Times New Roman" panose="02020603050405020304" pitchFamily="18" charset="0"/>
-            </a:endParaRPr>
-          </a:p>
-          <a:p>
-            <a:pPr marL="457200" indent="-457200">
-              <a:buFont typeface="Arial" panose="020B0604020202020204" pitchFamily="34" charset="0"/>
-              <a:buChar char="•"/>
-            </a:pPr>
-            <a:endParaRPr lang="en-US" sz="3400" dirty="0">
-              <a:latin typeface="Times New Roman" panose="02020603050405020304" pitchFamily="18" charset="0"/>
-              <a:cs typeface="Times New Roman" panose="02020603050405020304" pitchFamily="18" charset="0"/>
-            </a:endParaRPr>
           </a:p>
           <a:p>
             <a:pPr marL="457200" indent="-457200">
@@ -4068,8 +4114,8 @@
         </p:nvSpPr>
         <p:spPr>
           <a:xfrm>
-            <a:off x="22695880" y="19598476"/>
-            <a:ext cx="16266148" cy="12557284"/>
+            <a:off x="22337484" y="19598476"/>
+            <a:ext cx="16425904" cy="12557284"/>
           </a:xfrm>
           <a:prstGeom prst="rect">
             <a:avLst/>
@@ -4102,7 +4148,14 @@
                 <a:latin typeface="Times New Roman" panose="02020603050405020304" pitchFamily="18" charset="0"/>
                 <a:cs typeface="Times New Roman" panose="02020603050405020304" pitchFamily="18" charset="0"/>
               </a:rPr>
-              <a:t>R^2</a:t>
+              <a:t>R</a:t>
+            </a:r>
+            <a:r>
+              <a:rPr lang="en-US" sz="3200" b="1" baseline="30000" dirty="0">
+                <a:latin typeface="Times New Roman" panose="02020603050405020304" pitchFamily="18" charset="0"/>
+                <a:cs typeface="Times New Roman" panose="02020603050405020304" pitchFamily="18" charset="0"/>
+              </a:rPr>
+              <a:t>2</a:t>
             </a:r>
           </a:p>
           <a:p>
@@ -4115,7 +4168,21 @@
                 <a:latin typeface="Times New Roman" panose="02020603050405020304" pitchFamily="18" charset="0"/>
                 <a:cs typeface="Times New Roman" panose="02020603050405020304" pitchFamily="18" charset="0"/>
               </a:rPr>
-              <a:t>No fixed effect R^2 = 0.092. (Number of telehealth visits is explained little by the variables)</a:t>
+              <a:t>No fixed effect R</a:t>
+            </a:r>
+            <a:r>
+              <a:rPr lang="en-US" sz="3200" baseline="30000" dirty="0">
+                <a:latin typeface="Times New Roman" panose="02020603050405020304" pitchFamily="18" charset="0"/>
+                <a:cs typeface="Times New Roman" panose="02020603050405020304" pitchFamily="18" charset="0"/>
+              </a:rPr>
+              <a:t>2</a:t>
+            </a:r>
+            <a:r>
+              <a:rPr lang="en-US" sz="3200" dirty="0">
+                <a:latin typeface="Times New Roman" panose="02020603050405020304" pitchFamily="18" charset="0"/>
+                <a:cs typeface="Times New Roman" panose="02020603050405020304" pitchFamily="18" charset="0"/>
+              </a:rPr>
+              <a:t> = 0.092. (Number of telehealth visits is explained little by the variables)</a:t>
             </a:r>
           </a:p>
           <a:p>
@@ -4128,7 +4195,21 @@
                 <a:latin typeface="Times New Roman" panose="02020603050405020304" pitchFamily="18" charset="0"/>
                 <a:cs typeface="Times New Roman" panose="02020603050405020304" pitchFamily="18" charset="0"/>
               </a:rPr>
-              <a:t>With fixed effect R^2 = 0.139 (Explains more of the variation)</a:t>
+              <a:t>With fixed effect R</a:t>
+            </a:r>
+            <a:r>
+              <a:rPr lang="en-US" sz="3200" baseline="30000" dirty="0">
+                <a:latin typeface="Times New Roman" panose="02020603050405020304" pitchFamily="18" charset="0"/>
+                <a:cs typeface="Times New Roman" panose="02020603050405020304" pitchFamily="18" charset="0"/>
+              </a:rPr>
+              <a:t>2</a:t>
+            </a:r>
+            <a:r>
+              <a:rPr lang="en-US" sz="3200" dirty="0">
+                <a:latin typeface="Times New Roman" panose="02020603050405020304" pitchFamily="18" charset="0"/>
+                <a:cs typeface="Times New Roman" panose="02020603050405020304" pitchFamily="18" charset="0"/>
+              </a:rPr>
+              <a:t> = 0.139 (Explains more of the variation)</a:t>
             </a:r>
           </a:p>
           <a:p>
@@ -4555,9 +4636,6 @@
             </a:pPr>
             <a:r>
               <a:rPr lang="en-US" sz="2400" dirty="0">
-                <a:solidFill>
-                  <a:srgbClr val="000000"/>
-                </a:solidFill>
                 <a:effectLst/>
                 <a:latin typeface="Times New Roman" panose="02020603050405020304" pitchFamily="18" charset="0"/>
                 <a:ea typeface="Times New Roman" panose="02020603050405020304" pitchFamily="18" charset="0"/>
@@ -4567,9 +4645,6 @@
             </a:r>
             <a:r>
               <a:rPr lang="en-US" sz="2400" dirty="0" err="1">
-                <a:solidFill>
-                  <a:srgbClr val="000000"/>
-                </a:solidFill>
                 <a:effectLst/>
                 <a:latin typeface="Times New Roman" panose="02020603050405020304" pitchFamily="18" charset="0"/>
                 <a:ea typeface="Times New Roman" panose="02020603050405020304" pitchFamily="18" charset="0"/>
@@ -4579,9 +4654,6 @@
             </a:r>
             <a:r>
               <a:rPr lang="en-US" sz="2400" dirty="0">
-                <a:solidFill>
-                  <a:srgbClr val="000000"/>
-                </a:solidFill>
                 <a:effectLst/>
                 <a:latin typeface="Times New Roman" panose="02020603050405020304" pitchFamily="18" charset="0"/>
                 <a:ea typeface="Times New Roman" panose="02020603050405020304" pitchFamily="18" charset="0"/>
@@ -4591,9 +4663,6 @@
             </a:r>
             <a:r>
               <a:rPr lang="en-US" sz="2400" dirty="0" err="1">
-                <a:solidFill>
-                  <a:srgbClr val="000000"/>
-                </a:solidFill>
                 <a:effectLst/>
                 <a:latin typeface="Times New Roman" panose="02020603050405020304" pitchFamily="18" charset="0"/>
                 <a:ea typeface="Times New Roman" panose="02020603050405020304" pitchFamily="18" charset="0"/>
@@ -4603,9 +4672,6 @@
             </a:r>
             <a:r>
               <a:rPr lang="en-US" sz="2400" dirty="0">
-                <a:solidFill>
-                  <a:srgbClr val="000000"/>
-                </a:solidFill>
                 <a:effectLst/>
                 <a:latin typeface="Times New Roman" panose="02020603050405020304" pitchFamily="18" charset="0"/>
                 <a:ea typeface="Times New Roman" panose="02020603050405020304" pitchFamily="18" charset="0"/>
@@ -4615,9 +4681,6 @@
             </a:r>
             <a:r>
               <a:rPr lang="en-US" sz="2200" dirty="0">
-                <a:solidFill>
-                  <a:srgbClr val="000000"/>
-                </a:solidFill>
                 <a:effectLst/>
                 <a:latin typeface="Times New Roman" panose="02020603050405020304" pitchFamily="18" charset="0"/>
                 <a:ea typeface="Times New Roman" panose="02020603050405020304" pitchFamily="18" charset="0"/>
@@ -4627,21 +4690,21 @@
             </a:r>
             <a:r>
               <a:rPr lang="en-US" sz="2200" dirty="0">
-                <a:solidFill>
-                  <a:srgbClr val="0066CC"/>
-                </a:solidFill>
                 <a:effectLst/>
                 <a:latin typeface="Times New Roman" panose="02020603050405020304" pitchFamily="18" charset="0"/>
                 <a:ea typeface="Times New Roman" panose="02020603050405020304" pitchFamily="18" charset="0"/>
                 <a:cs typeface="Times New Roman" panose="02020603050405020304" pitchFamily="18" charset="0"/>
-                <a:hlinkClick r:id="rId3"/>
+                <a:hlinkClick r:id="rId3">
+                  <a:extLst>
+                    <a:ext uri="{A12FA001-AC4F-418D-AE19-62706E023703}">
+                      <ahyp:hlinkClr xmlns:ahyp="http://schemas.microsoft.com/office/drawing/2018/hyperlinkcolor" val="tx"/>
+                    </a:ext>
+                  </a:extLst>
+                </a:hlinkClick>
               </a:rPr>
               <a:t>https://doi.org/10.1377/hlthaff.2016.1130</a:t>
             </a:r>
             <a:endParaRPr lang="en-US" sz="2200" dirty="0">
-              <a:solidFill>
-                <a:srgbClr val="0066CC"/>
-              </a:solidFill>
               <a:latin typeface="Times New Roman" panose="02020603050405020304" pitchFamily="18" charset="0"/>
               <a:ea typeface="Times New Roman" panose="02020603050405020304" pitchFamily="18" charset="0"/>
               <a:cs typeface="Times New Roman" panose="02020603050405020304" pitchFamily="18" charset="0"/>
@@ -4652,9 +4715,6 @@
               <a:buNone/>
             </a:pPr>
             <a:endParaRPr lang="en-US" sz="2200" dirty="0">
-              <a:solidFill>
-                <a:srgbClr val="0066CC"/>
-              </a:solidFill>
               <a:effectLst/>
               <a:latin typeface="Times New Roman" panose="02020603050405020304" pitchFamily="18" charset="0"/>
               <a:ea typeface="Times New Roman" panose="02020603050405020304" pitchFamily="18" charset="0"/>
@@ -4676,14 +4736,17 @@
             </a:r>
             <a:r>
               <a:rPr lang="en-US" sz="2200" dirty="0">
-                <a:solidFill>
-                  <a:srgbClr val="1155CC"/>
-                </a:solidFill>
                 <a:effectLst/>
                 <a:latin typeface="Times New Roman" panose="02020603050405020304" pitchFamily="18" charset="0"/>
                 <a:ea typeface="Times New Roman" panose="02020603050405020304" pitchFamily="18" charset="0"/>
                 <a:cs typeface="Times New Roman" panose="02020603050405020304" pitchFamily="18" charset="0"/>
-                <a:hlinkClick r:id="rId4"/>
+                <a:hlinkClick r:id="rId4">
+                  <a:extLst>
+                    <a:ext uri="{A12FA001-AC4F-418D-AE19-62706E023703}">
+                      <ahyp:hlinkClr xmlns:ahyp="http://schemas.microsoft.com/office/drawing/2018/hyperlinkcolor" val="tx"/>
+                    </a:ext>
+                  </a:extLst>
+                </a:hlinkClick>
               </a:rPr>
               <a:t>https://catalog.data.gov/dataset/medicare-telemedicine-snapshot</a:t>
             </a:r>
@@ -4706,9 +4769,6 @@
               <a:buNone/>
             </a:pPr>
             <a:endParaRPr lang="en-US" sz="2200" dirty="0">
-              <a:solidFill>
-                <a:srgbClr val="000000"/>
-              </a:solidFill>
               <a:effectLst/>
               <a:latin typeface="Times New Roman" panose="02020603050405020304" pitchFamily="18" charset="0"/>
               <a:ea typeface="Times New Roman" panose="02020603050405020304" pitchFamily="18" charset="0"/>
@@ -4721,9 +4781,6 @@
             </a:pPr>
             <a:r>
               <a:rPr lang="en-US" sz="2200" dirty="0">
-                <a:solidFill>
-                  <a:srgbClr val="000000"/>
-                </a:solidFill>
                 <a:effectLst/>
                 <a:latin typeface="Times New Roman" panose="02020603050405020304" pitchFamily="18" charset="0"/>
                 <a:ea typeface="Times New Roman" panose="02020603050405020304" pitchFamily="18" charset="0"/>
@@ -4733,9 +4790,6 @@
             </a:r>
             <a:r>
               <a:rPr lang="en-US" sz="2200" dirty="0">
-                <a:solidFill>
-                  <a:srgbClr val="0066CC"/>
-                </a:solidFill>
                 <a:latin typeface="Times New Roman" panose="02020603050405020304" pitchFamily="18" charset="0"/>
                 <a:cs typeface="Times New Roman" panose="02020603050405020304" pitchFamily="18" charset="0"/>
                 <a:hlinkClick r:id="rId5">
@@ -4749,9 +4803,6 @@
               <a:t>https://doi.org/10.1377/hlthaff.2018.05125</a:t>
             </a:r>
             <a:endParaRPr lang="en-US" sz="2200" dirty="0">
-              <a:solidFill>
-                <a:srgbClr val="0066CC"/>
-              </a:solidFill>
               <a:latin typeface="Times New Roman" panose="02020603050405020304" pitchFamily="18" charset="0"/>
               <a:cs typeface="Times New Roman" panose="02020603050405020304" pitchFamily="18" charset="0"/>
             </a:endParaRPr>
@@ -4761,9 +4812,6 @@
               <a:buNone/>
             </a:pPr>
             <a:endParaRPr lang="en-US" sz="2200" dirty="0">
-              <a:solidFill>
-                <a:srgbClr val="0066CC"/>
-              </a:solidFill>
               <a:effectLst/>
               <a:latin typeface="Times New Roman" panose="02020603050405020304" pitchFamily="18" charset="0"/>
               <a:ea typeface="Times New Roman" panose="02020603050405020304" pitchFamily="18" charset="0"/>
@@ -4776,9 +4824,6 @@
             </a:pPr>
             <a:r>
               <a:rPr lang="en-US" sz="2200" dirty="0">
-                <a:solidFill>
-                  <a:srgbClr val="000000"/>
-                </a:solidFill>
                 <a:effectLst/>
                 <a:latin typeface="Times New Roman" panose="02020603050405020304" pitchFamily="18" charset="0"/>
                 <a:ea typeface="Times New Roman" panose="02020603050405020304" pitchFamily="18" charset="0"/>
@@ -4788,9 +4833,6 @@
             </a:r>
             <a:r>
               <a:rPr lang="en-US" sz="2200" i="1" dirty="0">
-                <a:solidFill>
-                  <a:srgbClr val="000000"/>
-                </a:solidFill>
                 <a:effectLst/>
                 <a:latin typeface="Times New Roman" panose="02020603050405020304" pitchFamily="18" charset="0"/>
                 <a:ea typeface="Times New Roman" panose="02020603050405020304" pitchFamily="18" charset="0"/>
@@ -4800,14 +4842,17 @@
             </a:r>
             <a:r>
               <a:rPr lang="en-US" sz="2200" u="none" strike="noStrike" dirty="0">
-                <a:solidFill>
-                  <a:srgbClr val="0066CC"/>
-                </a:solidFill>
                 <a:effectLst/>
                 <a:latin typeface="Times New Roman" panose="02020603050405020304" pitchFamily="18" charset="0"/>
                 <a:ea typeface="Times New Roman" panose="02020603050405020304" pitchFamily="18" charset="0"/>
                 <a:cs typeface="Times New Roman" panose="02020603050405020304" pitchFamily="18" charset="0"/>
-                <a:hlinkClick r:id="rId6"/>
+                <a:hlinkClick r:id="rId6">
+                  <a:extLst>
+                    <a:ext uri="{A12FA001-AC4F-418D-AE19-62706E023703}">
+                      <ahyp:hlinkClr xmlns:ahyp="http://schemas.microsoft.com/office/drawing/2018/hyperlinkcolor" val="tx"/>
+                    </a:ext>
+                  </a:extLst>
+                </a:hlinkClick>
               </a:rPr>
               <a:t>https://www.census.gov/newsroom/press-releases/2024/computer-internet-use-2021.html</a:t>
             </a:r>
@@ -4849,8 +4894,8 @@
         </p:blipFill>
         <p:spPr bwMode="auto">
           <a:xfrm>
-            <a:off x="10957627" y="14341890"/>
-            <a:ext cx="11197412" cy="7752054"/>
+            <a:off x="10992855" y="5702035"/>
+            <a:ext cx="10595993" cy="7335687"/>
           </a:xfrm>
           <a:prstGeom prst="rect">
             <a:avLst/>
@@ -4901,8 +4946,8 @@
         </p:blipFill>
         <p:spPr bwMode="auto">
           <a:xfrm>
-            <a:off x="10986581" y="24268310"/>
-            <a:ext cx="11231709" cy="7832073"/>
+            <a:off x="10951734" y="15375295"/>
+            <a:ext cx="10602173" cy="7393086"/>
           </a:xfrm>
           <a:prstGeom prst="rect">
             <a:avLst/>
@@ -4940,8 +4985,8 @@
         </p:nvSpPr>
         <p:spPr bwMode="auto">
           <a:xfrm>
-            <a:off x="10992761" y="13043050"/>
-            <a:ext cx="11225529" cy="892552"/>
+            <a:off x="10992855" y="4327354"/>
+            <a:ext cx="10595993" cy="861774"/>
           </a:xfrm>
           <a:prstGeom prst="rect">
             <a:avLst/>
@@ -5054,8 +5099,8 @@
         </p:nvSpPr>
         <p:spPr bwMode="auto">
           <a:xfrm>
-            <a:off x="10957819" y="22507805"/>
-            <a:ext cx="11289231" cy="1354217"/>
+            <a:off x="10992854" y="13583702"/>
+            <a:ext cx="10595993" cy="1354217"/>
           </a:xfrm>
           <a:prstGeom prst="rect">
             <a:avLst/>
@@ -5272,14 +5317,14 @@
           <p:nvPr>
             <p:extLst>
               <p:ext uri="{D42A27DB-BD31-4B8C-83A1-F6EECF244321}">
-                <p14:modId xmlns:p14="http://schemas.microsoft.com/office/powerpoint/2010/main" val="4207707237"/>
+                <p14:modId xmlns:p14="http://schemas.microsoft.com/office/powerpoint/2010/main" val="1084123494"/>
               </p:ext>
             </p:extLst>
           </p:nvPr>
         </p:nvGraphicFramePr>
         <p:xfrm>
-          <a:off x="22788081" y="5643715"/>
-          <a:ext cx="16173948" cy="12655733"/>
+          <a:off x="22337486" y="5643716"/>
+          <a:ext cx="16425902" cy="12655733"/>
         </p:xfrm>
         <a:graphic>
           <a:graphicData uri="http://schemas.openxmlformats.org/drawingml/2006/table">
@@ -5288,28 +5333,28 @@
                 <a:tableStyleId>{5C22544A-7EE6-4342-B048-85BDC9FD1C3A}</a:tableStyleId>
               </a:tblPr>
               <a:tblGrid>
-                <a:gridCol w="4042621">
+                <a:gridCol w="4105596">
                   <a:extLst>
                     <a:ext uri="{9D8B030D-6E8A-4147-A177-3AD203B41FA5}">
                       <a16:colId xmlns:a16="http://schemas.microsoft.com/office/drawing/2014/main" val="3579134900"/>
                     </a:ext>
                   </a:extLst>
                 </a:gridCol>
-                <a:gridCol w="4042621">
+                <a:gridCol w="4105596">
                   <a:extLst>
                     <a:ext uri="{9D8B030D-6E8A-4147-A177-3AD203B41FA5}">
                       <a16:colId xmlns:a16="http://schemas.microsoft.com/office/drawing/2014/main" val="153221796"/>
                     </a:ext>
                   </a:extLst>
                 </a:gridCol>
-                <a:gridCol w="4044353">
+                <a:gridCol w="4107355">
                   <a:extLst>
                     <a:ext uri="{9D8B030D-6E8A-4147-A177-3AD203B41FA5}">
                       <a16:colId xmlns:a16="http://schemas.microsoft.com/office/drawing/2014/main" val="960077209"/>
                     </a:ext>
                   </a:extLst>
                 </a:gridCol>
-                <a:gridCol w="4044353">
+                <a:gridCol w="4107355">
                   <a:extLst>
                     <a:ext uri="{9D8B030D-6E8A-4147-A177-3AD203B41FA5}">
                       <a16:colId xmlns:a16="http://schemas.microsoft.com/office/drawing/2014/main" val="1505452983"/>
@@ -10408,9 +10453,20 @@
                           <a:latin typeface="Times New Roman" panose="02020603050405020304" pitchFamily="18" charset="0"/>
                           <a:cs typeface="Times New Roman" panose="02020603050405020304" pitchFamily="18" charset="0"/>
                         </a:rPr>
-                        <a:t>R2</a:t>
+                        <a:t>R</a:t>
                       </a:r>
-                      <a:endParaRPr lang="en-US" sz="3200" b="0" i="0" dirty="0">
+                      <a:r>
+                        <a:rPr lang="en-US" sz="3200" b="0" i="0" baseline="30000" dirty="0">
+                          <a:solidFill>
+                            <a:schemeClr val="tx1"/>
+                          </a:solidFill>
+                          <a:effectLst/>
+                          <a:latin typeface="Times New Roman" panose="02020603050405020304" pitchFamily="18" charset="0"/>
+                          <a:cs typeface="Times New Roman" panose="02020603050405020304" pitchFamily="18" charset="0"/>
+                        </a:rPr>
+                        <a:t>2</a:t>
+                      </a:r>
+                      <a:endParaRPr lang="en-US" sz="3200" b="0" i="0" baseline="30000" dirty="0">
                         <a:solidFill>
                           <a:schemeClr val="tx1"/>
                         </a:solidFill>
@@ -10723,8 +10779,8 @@
         </p:nvSpPr>
         <p:spPr bwMode="auto">
           <a:xfrm>
-            <a:off x="22788080" y="4292231"/>
-            <a:ext cx="16173948" cy="1077218"/>
+            <a:off x="22337484" y="4292231"/>
+            <a:ext cx="16425902" cy="1077218"/>
           </a:xfrm>
           <a:prstGeom prst="rect">
             <a:avLst/>
@@ -10804,8 +10860,8 @@
         </p:nvSpPr>
         <p:spPr>
           <a:xfrm>
-            <a:off x="22788080" y="18471908"/>
-            <a:ext cx="16173948" cy="954107"/>
+            <a:off x="22337484" y="18471908"/>
+            <a:ext cx="16425902" cy="954107"/>
           </a:xfrm>
           <a:prstGeom prst="rect">
             <a:avLst/>
@@ -10844,348 +10900,6 @@
               </a:rPr>
               <a:t> Statistical significance for coefficients is shown by *p &lt; 0:10 **p &lt; 0:05 ***p &lt; 0:01 ****p &lt; 0:001. Standard Errors are included in parenthesis.</a:t>
             </a:r>
-          </a:p>
-        </p:txBody>
-      </p:sp>
-      <p:sp>
-        <p:nvSpPr>
-          <p:cNvPr id="37" name="TextBox 36">
-            <a:extLst>
-              <a:ext uri="{FF2B5EF4-FFF2-40B4-BE49-F238E27FC236}">
-                <a16:creationId xmlns:a16="http://schemas.microsoft.com/office/drawing/2014/main" id="{715BF4FC-A00E-111C-D72F-2BAE26A2198B}"/>
-              </a:ext>
-            </a:extLst>
-          </p:cNvPr>
-          <p:cNvSpPr txBox="1"/>
-          <p:nvPr/>
-        </p:nvSpPr>
-        <p:spPr>
-          <a:xfrm>
-            <a:off x="11021522" y="4327354"/>
-            <a:ext cx="11225528" cy="8186857"/>
-          </a:xfrm>
-          <a:prstGeom prst="rect">
-            <a:avLst/>
-          </a:prstGeom>
-          <a:noFill/>
-          <a:ln w="127000" cmpd="sng">
-            <a:solidFill>
-              <a:schemeClr val="tx1"/>
-            </a:solidFill>
-          </a:ln>
-        </p:spPr>
-        <p:txBody>
-          <a:bodyPr wrap="square" lIns="274320" tIns="274320" rIns="274320" bIns="274320" rtlCol="0">
-            <a:spAutoFit/>
-          </a:bodyPr>
-          <a:lstStyle/>
-          <a:p>
-            <a:pPr algn="ctr"/>
-            <a:r>
-              <a:rPr lang="en-US" sz="4400" b="1" dirty="0">
-                <a:latin typeface="Arial" panose="020B0604020202020204" pitchFamily="34" charset="0"/>
-                <a:cs typeface="Arial" panose="020B0604020202020204" pitchFamily="34" charset="0"/>
-              </a:rPr>
-              <a:t>Results</a:t>
-            </a:r>
-          </a:p>
-          <a:p>
-            <a:r>
-              <a:rPr kumimoji="0" lang="en-US" altLang="en-US" sz="3200" b="1" i="0" u="none" strike="noStrike" cap="none" normalizeH="0" baseline="0" dirty="0">
-                <a:ln>
-                  <a:noFill/>
-                </a:ln>
-                <a:solidFill>
-                  <a:schemeClr val="tx1"/>
-                </a:solidFill>
-                <a:effectLst/>
-                <a:latin typeface="Times New Roman" panose="02020603050405020304" pitchFamily="18" charset="0"/>
-                <a:ea typeface="Times New Roman" panose="02020603050405020304" pitchFamily="18" charset="0"/>
-                <a:cs typeface="Times New Roman" panose="02020603050405020304" pitchFamily="18" charset="0"/>
-              </a:rPr>
-              <a:t>Figure 1</a:t>
-            </a:r>
-            <a:r>
-              <a:rPr kumimoji="0" lang="en-US" altLang="en-US" sz="3200" b="0" i="0" u="none" strike="noStrike" cap="none" normalizeH="0" baseline="0" dirty="0">
-                <a:ln>
-                  <a:noFill/>
-                </a:ln>
-                <a:solidFill>
-                  <a:schemeClr val="tx1"/>
-                </a:solidFill>
-                <a:effectLst/>
-                <a:latin typeface="Times New Roman" panose="02020603050405020304" pitchFamily="18" charset="0"/>
-                <a:ea typeface="Times New Roman" panose="02020603050405020304" pitchFamily="18" charset="0"/>
-                <a:cs typeface="Times New Roman" panose="02020603050405020304" pitchFamily="18" charset="0"/>
-              </a:rPr>
-              <a:t> </a:t>
-            </a:r>
-          </a:p>
-          <a:p>
-            <a:pPr marL="457200" indent="-457200">
-              <a:buFont typeface="Arial" panose="020B0604020202020204" pitchFamily="34" charset="0"/>
-              <a:buChar char="•"/>
-            </a:pPr>
-            <a:r>
-              <a:rPr lang="en-US" altLang="en-US" sz="3200" dirty="0">
-                <a:latin typeface="Times New Roman" panose="02020603050405020304" pitchFamily="18" charset="0"/>
-                <a:ea typeface="Times New Roman" panose="02020603050405020304" pitchFamily="18" charset="0"/>
-                <a:cs typeface="Times New Roman" panose="02020603050405020304" pitchFamily="18" charset="0"/>
-              </a:rPr>
-              <a:t>The </a:t>
-            </a:r>
-            <a:r>
-              <a:rPr kumimoji="0" lang="en-US" altLang="en-US" sz="3200" b="0" i="0" u="none" strike="noStrike" cap="none" normalizeH="0" baseline="0" dirty="0">
-                <a:ln>
-                  <a:noFill/>
-                </a:ln>
-                <a:solidFill>
-                  <a:schemeClr val="tx1"/>
-                </a:solidFill>
-                <a:effectLst/>
-                <a:latin typeface="Times New Roman" panose="02020603050405020304" pitchFamily="18" charset="0"/>
-                <a:ea typeface="Times New Roman" panose="02020603050405020304" pitchFamily="18" charset="0"/>
-                <a:cs typeface="Times New Roman" panose="02020603050405020304" pitchFamily="18" charset="0"/>
-              </a:rPr>
-              <a:t>number of telehealth services was the highest in 2020 </a:t>
-            </a:r>
-          </a:p>
-          <a:p>
-            <a:pPr marL="457200" indent="-457200">
-              <a:buFont typeface="Arial" panose="020B0604020202020204" pitchFamily="34" charset="0"/>
-              <a:buChar char="•"/>
-            </a:pPr>
-            <a:r>
-              <a:rPr lang="en-US" altLang="en-US" sz="3200" dirty="0">
-                <a:latin typeface="Times New Roman" panose="02020603050405020304" pitchFamily="18" charset="0"/>
-                <a:ea typeface="Times New Roman" panose="02020603050405020304" pitchFamily="18" charset="0"/>
-                <a:cs typeface="Times New Roman" panose="02020603050405020304" pitchFamily="18" charset="0"/>
-              </a:rPr>
-              <a:t>In </a:t>
-            </a:r>
-            <a:r>
-              <a:rPr kumimoji="0" lang="en-US" altLang="en-US" sz="3200" b="0" i="0" u="none" strike="noStrike" cap="none" normalizeH="0" baseline="0" dirty="0">
-                <a:ln>
-                  <a:noFill/>
-                </a:ln>
-                <a:solidFill>
-                  <a:schemeClr val="tx1"/>
-                </a:solidFill>
-                <a:effectLst/>
-                <a:latin typeface="Times New Roman" panose="02020603050405020304" pitchFamily="18" charset="0"/>
-                <a:ea typeface="Times New Roman" panose="02020603050405020304" pitchFamily="18" charset="0"/>
-                <a:cs typeface="Times New Roman" panose="02020603050405020304" pitchFamily="18" charset="0"/>
-              </a:rPr>
-              <a:t>pandemic almost all in person visits became virtual</a:t>
-            </a:r>
-          </a:p>
-          <a:p>
-            <a:pPr marL="457200" indent="-457200">
-              <a:buFont typeface="Arial" panose="020B0604020202020204" pitchFamily="34" charset="0"/>
-              <a:buChar char="•"/>
-            </a:pPr>
-            <a:endParaRPr lang="en-US" altLang="en-US" sz="3200" dirty="0">
-              <a:latin typeface="Times New Roman" panose="02020603050405020304" pitchFamily="18" charset="0"/>
-              <a:ea typeface="Times New Roman" panose="02020603050405020304" pitchFamily="18" charset="0"/>
-              <a:cs typeface="Times New Roman" panose="02020603050405020304" pitchFamily="18" charset="0"/>
-            </a:endParaRPr>
-          </a:p>
-          <a:p>
-            <a:r>
-              <a:rPr kumimoji="0" lang="en-US" altLang="en-US" sz="3200" b="1" u="none" strike="noStrike" cap="none" normalizeH="0" baseline="0" dirty="0">
-                <a:ln>
-                  <a:noFill/>
-                </a:ln>
-                <a:solidFill>
-                  <a:schemeClr val="tx1"/>
-                </a:solidFill>
-                <a:effectLst/>
-                <a:latin typeface="Times New Roman" panose="02020603050405020304" pitchFamily="18" charset="0"/>
-                <a:ea typeface="Times New Roman" panose="02020603050405020304" pitchFamily="18" charset="0"/>
-                <a:cs typeface="Times New Roman" panose="02020603050405020304" pitchFamily="18" charset="0"/>
-              </a:rPr>
-              <a:t>Figure 2 </a:t>
-            </a:r>
-            <a:endParaRPr kumimoji="0" lang="en-US" altLang="en-US" sz="3200" b="0" i="0" u="none" strike="noStrike" cap="none" normalizeH="0" baseline="0" dirty="0">
-              <a:ln>
-                <a:noFill/>
-              </a:ln>
-              <a:solidFill>
-                <a:schemeClr val="tx1"/>
-              </a:solidFill>
-              <a:effectLst/>
-              <a:latin typeface="Times New Roman" panose="02020603050405020304" pitchFamily="18" charset="0"/>
-              <a:ea typeface="Times New Roman" panose="02020603050405020304" pitchFamily="18" charset="0"/>
-              <a:cs typeface="Times New Roman" panose="02020603050405020304" pitchFamily="18" charset="0"/>
-            </a:endParaRPr>
-          </a:p>
-          <a:p>
-            <a:pPr marL="457200" indent="-457200">
-              <a:buFont typeface="Arial" panose="020B0604020202020204" pitchFamily="34" charset="0"/>
-              <a:buChar char="•"/>
-            </a:pPr>
-            <a:r>
-              <a:rPr lang="en-US" altLang="en-US" sz="3200" dirty="0">
-                <a:latin typeface="Times New Roman" panose="02020603050405020304" pitchFamily="18" charset="0"/>
-                <a:ea typeface="Times New Roman" panose="02020603050405020304" pitchFamily="18" charset="0"/>
-                <a:cs typeface="Times New Roman" panose="02020603050405020304" pitchFamily="18" charset="0"/>
-              </a:rPr>
-              <a:t>After </a:t>
-            </a:r>
-            <a:r>
-              <a:rPr kumimoji="0" lang="en-US" altLang="en-US" sz="3200" b="0" i="0" u="none" strike="noStrike" cap="none" normalizeH="0" baseline="0" dirty="0">
-                <a:ln>
-                  <a:noFill/>
-                </a:ln>
-                <a:solidFill>
-                  <a:schemeClr val="tx1"/>
-                </a:solidFill>
-                <a:effectLst/>
-                <a:latin typeface="Times New Roman" panose="02020603050405020304" pitchFamily="18" charset="0"/>
-                <a:ea typeface="Times New Roman" panose="02020603050405020304" pitchFamily="18" charset="0"/>
-                <a:cs typeface="Times New Roman" panose="02020603050405020304" pitchFamily="18" charset="0"/>
-              </a:rPr>
-              <a:t>2020, only a small decline in the number of services that are eligible for telehealth use. </a:t>
-            </a:r>
-          </a:p>
-          <a:p>
-            <a:endParaRPr lang="en-US" altLang="en-US" sz="3200" dirty="0">
-              <a:latin typeface="Times New Roman" panose="02020603050405020304" pitchFamily="18" charset="0"/>
-              <a:ea typeface="Times New Roman" panose="02020603050405020304" pitchFamily="18" charset="0"/>
-              <a:cs typeface="Times New Roman" panose="02020603050405020304" pitchFamily="18" charset="0"/>
-            </a:endParaRPr>
-          </a:p>
-          <a:p>
-            <a:r>
-              <a:rPr kumimoji="0" lang="en-US" altLang="en-US" sz="3200" b="1" i="0" u="none" strike="noStrike" cap="none" normalizeH="0" baseline="0" dirty="0">
-                <a:ln>
-                  <a:noFill/>
-                </a:ln>
-                <a:solidFill>
-                  <a:schemeClr val="tx1"/>
-                </a:solidFill>
-                <a:effectLst/>
-                <a:latin typeface="Times New Roman" panose="02020603050405020304" pitchFamily="18" charset="0"/>
-                <a:ea typeface="Times New Roman" panose="02020603050405020304" pitchFamily="18" charset="0"/>
-                <a:cs typeface="Times New Roman" panose="02020603050405020304" pitchFamily="18" charset="0"/>
-              </a:rPr>
-              <a:t>This research </a:t>
-            </a:r>
-            <a:r>
-              <a:rPr lang="en-US" altLang="en-US" sz="3200" b="1" dirty="0">
-                <a:latin typeface="Times New Roman" panose="02020603050405020304" pitchFamily="18" charset="0"/>
-                <a:ea typeface="Times New Roman" panose="02020603050405020304" pitchFamily="18" charset="0"/>
-                <a:cs typeface="Times New Roman" panose="02020603050405020304" pitchFamily="18" charset="0"/>
-              </a:rPr>
-              <a:t>could </a:t>
-            </a:r>
-            <a:r>
-              <a:rPr kumimoji="0" lang="en-US" altLang="en-US" sz="3200" b="1" i="0" u="none" strike="noStrike" cap="none" normalizeH="0" baseline="0" dirty="0">
-                <a:ln>
-                  <a:noFill/>
-                </a:ln>
-                <a:solidFill>
-                  <a:schemeClr val="tx1"/>
-                </a:solidFill>
-                <a:effectLst/>
-                <a:latin typeface="Times New Roman" panose="02020603050405020304" pitchFamily="18" charset="0"/>
-                <a:ea typeface="Times New Roman" panose="02020603050405020304" pitchFamily="18" charset="0"/>
-                <a:cs typeface="Times New Roman" panose="02020603050405020304" pitchFamily="18" charset="0"/>
-              </a:rPr>
-              <a:t>support :</a:t>
-            </a:r>
-          </a:p>
-          <a:p>
-            <a:pPr marL="457200" indent="-457200">
-              <a:buFont typeface="Arial" panose="020B0604020202020204" pitchFamily="34" charset="0"/>
-              <a:buChar char="•"/>
-            </a:pPr>
-            <a:r>
-              <a:rPr kumimoji="0" lang="en-US" altLang="en-US" sz="3200" b="0" i="0" u="none" strike="noStrike" cap="none" normalizeH="0" baseline="0" dirty="0">
-                <a:ln>
-                  <a:noFill/>
-                </a:ln>
-                <a:solidFill>
-                  <a:schemeClr val="tx1"/>
-                </a:solidFill>
-                <a:effectLst/>
-                <a:latin typeface="Times New Roman" panose="02020603050405020304" pitchFamily="18" charset="0"/>
-                <a:ea typeface="Times New Roman" panose="02020603050405020304" pitchFamily="18" charset="0"/>
-                <a:cs typeface="Times New Roman" panose="02020603050405020304" pitchFamily="18" charset="0"/>
-              </a:rPr>
-              <a:t>Increasing the use of telehealth services</a:t>
-            </a:r>
-            <a:r>
-              <a:rPr lang="en-US" altLang="en-US" sz="3200" dirty="0">
-                <a:latin typeface="Times New Roman" panose="02020603050405020304" pitchFamily="18" charset="0"/>
-                <a:ea typeface="Times New Roman" panose="02020603050405020304" pitchFamily="18" charset="0"/>
-                <a:cs typeface="Times New Roman" panose="02020603050405020304" pitchFamily="18" charset="0"/>
-              </a:rPr>
-              <a:t> </a:t>
-            </a:r>
-          </a:p>
-          <a:p>
-            <a:pPr marL="457200" indent="-457200">
-              <a:buFont typeface="Arial" panose="020B0604020202020204" pitchFamily="34" charset="0"/>
-              <a:buChar char="•"/>
-            </a:pPr>
-            <a:r>
-              <a:rPr lang="en-US" altLang="en-US" sz="3200" dirty="0">
-                <a:latin typeface="Times New Roman" panose="02020603050405020304" pitchFamily="18" charset="0"/>
-                <a:ea typeface="Times New Roman" panose="02020603050405020304" pitchFamily="18" charset="0"/>
-                <a:cs typeface="Times New Roman" panose="02020603050405020304" pitchFamily="18" charset="0"/>
-              </a:rPr>
-              <a:t>Specifically for </a:t>
-            </a:r>
-            <a:r>
-              <a:rPr kumimoji="0" lang="en-US" altLang="en-US" sz="3200" b="0" i="0" u="none" strike="noStrike" cap="none" normalizeH="0" baseline="0" dirty="0">
-                <a:ln>
-                  <a:noFill/>
-                </a:ln>
-                <a:solidFill>
-                  <a:schemeClr val="tx1"/>
-                </a:solidFill>
-                <a:effectLst/>
-                <a:latin typeface="Times New Roman" panose="02020603050405020304" pitchFamily="18" charset="0"/>
-                <a:ea typeface="Times New Roman" panose="02020603050405020304" pitchFamily="18" charset="0"/>
-                <a:cs typeface="Times New Roman" panose="02020603050405020304" pitchFamily="18" charset="0"/>
-              </a:rPr>
-              <a:t>populations who are </a:t>
-            </a:r>
-            <a:r>
-              <a:rPr lang="en-US" altLang="en-US" sz="3200" dirty="0">
-                <a:latin typeface="Times New Roman" panose="02020603050405020304" pitchFamily="18" charset="0"/>
-                <a:cs typeface="Times New Roman" panose="02020603050405020304" pitchFamily="18" charset="0"/>
-              </a:rPr>
-              <a:t>lacking </a:t>
-            </a:r>
-            <a:r>
-              <a:rPr lang="en-US" sz="3200" dirty="0">
-                <a:latin typeface="Times New Roman" panose="02020603050405020304" pitchFamily="18" charset="0"/>
-                <a:cs typeface="Times New Roman" panose="02020603050405020304" pitchFamily="18" charset="0"/>
-              </a:rPr>
-              <a:t>vs accessing eligible services.</a:t>
-            </a:r>
-          </a:p>
-          <a:p>
-            <a:pPr marL="457200" indent="-457200">
-              <a:buFont typeface="Arial" panose="020B0604020202020204" pitchFamily="34" charset="0"/>
-              <a:buChar char="•"/>
-            </a:pPr>
-            <a:endParaRPr lang="en-US" sz="3400" dirty="0">
-              <a:latin typeface="Times New Roman" panose="02020603050405020304" pitchFamily="18" charset="0"/>
-              <a:cs typeface="Times New Roman" panose="02020603050405020304" pitchFamily="18" charset="0"/>
-            </a:endParaRPr>
-          </a:p>
-          <a:p>
-            <a:pPr marL="457200" indent="-457200">
-              <a:buFont typeface="Arial" panose="020B0604020202020204" pitchFamily="34" charset="0"/>
-              <a:buChar char="•"/>
-            </a:pPr>
-            <a:endParaRPr lang="en-US" sz="3400" dirty="0">
-              <a:latin typeface="Times New Roman" panose="02020603050405020304" pitchFamily="18" charset="0"/>
-              <a:cs typeface="Times New Roman" panose="02020603050405020304" pitchFamily="18" charset="0"/>
-            </a:endParaRPr>
           </a:p>
         </p:txBody>
       </p:sp>
@@ -12572,8 +12286,8 @@
         </p:blipFill>
         <p:spPr>
           <a:xfrm>
-            <a:off x="1535253" y="1299287"/>
-            <a:ext cx="6584181" cy="2194727"/>
+            <a:off x="905935" y="1204674"/>
+            <a:ext cx="7348668" cy="2449556"/>
           </a:xfrm>
           <a:prstGeom prst="rect">
             <a:avLst/>
@@ -12602,12 +12316,167 @@
         </p:blipFill>
         <p:spPr>
           <a:xfrm>
-            <a:off x="43235046" y="1332088"/>
-            <a:ext cx="6584181" cy="2194727"/>
+            <a:off x="43086966" y="1299287"/>
+            <a:ext cx="7005972" cy="2335324"/>
           </a:xfrm>
           <a:prstGeom prst="rect">
             <a:avLst/>
           </a:prstGeom>
+        </p:spPr>
+      </p:pic>
+      <p:sp>
+        <p:nvSpPr>
+          <p:cNvPr id="49" name="Rectangle 4">
+            <a:extLst>
+              <a:ext uri="{FF2B5EF4-FFF2-40B4-BE49-F238E27FC236}">
+                <a16:creationId xmlns:a16="http://schemas.microsoft.com/office/drawing/2014/main" id="{8192A675-A60E-C5D4-F8A2-1CE0C29D5F3A}"/>
+              </a:ext>
+            </a:extLst>
+          </p:cNvPr>
+          <p:cNvSpPr>
+            <a:spLocks noChangeArrowheads="1"/>
+          </p:cNvSpPr>
+          <p:nvPr/>
+        </p:nvSpPr>
+        <p:spPr bwMode="auto">
+          <a:xfrm>
+            <a:off x="10951734" y="23205757"/>
+            <a:ext cx="10676683" cy="861774"/>
+          </a:xfrm>
+          <a:prstGeom prst="rect">
+            <a:avLst/>
+          </a:prstGeom>
+          <a:solidFill>
+            <a:schemeClr val="bg1"/>
+          </a:solidFill>
+          <a:ln w="9525">
+            <a:solidFill>
+              <a:schemeClr val="tx1"/>
+            </a:solidFill>
+            <a:miter lim="800000"/>
+            <a:headEnd/>
+            <a:tailEnd/>
+          </a:ln>
+          <a:effectLst/>
+        </p:spPr>
+        <p:txBody>
+          <a:bodyPr vert="horz" wrap="square" lIns="91440" tIns="45720" rIns="91440" bIns="45720" numCol="1" anchor="ctr" anchorCtr="0" compatLnSpc="1">
+            <a:prstTxWarp prst="textNoShape">
+              <a:avLst/>
+            </a:prstTxWarp>
+            <a:spAutoFit/>
+          </a:bodyPr>
+          <a:lstStyle/>
+          <a:p>
+            <a:pPr marL="0" marR="0" lvl="0" indent="0" algn="ctr" defTabSz="914400" rtl="0" eaLnBrk="0" fontAlgn="base" latinLnBrk="0" hangingPunct="0">
+              <a:spcBef>
+                <a:spcPct val="0"/>
+              </a:spcBef>
+              <a:spcAft>
+                <a:spcPct val="0"/>
+              </a:spcAft>
+              <a:buClrTx/>
+              <a:buSzTx/>
+              <a:buFontTx/>
+              <a:buNone/>
+              <a:tabLst/>
+            </a:pPr>
+            <a:r>
+              <a:rPr kumimoji="0" lang="en-US" altLang="en-US" sz="3200" b="1" u="none" strike="noStrike" cap="none" normalizeH="0" baseline="0" dirty="0">
+                <a:ln>
+                  <a:noFill/>
+                </a:ln>
+                <a:solidFill>
+                  <a:schemeClr val="tx1"/>
+                </a:solidFill>
+                <a:effectLst/>
+                <a:latin typeface="Arial" panose="020B0604020202020204" pitchFamily="34" charset="0"/>
+                <a:ea typeface="Arial" panose="020B0604020202020204" pitchFamily="34" charset="0"/>
+                <a:cs typeface="Arial" panose="020B0604020202020204" pitchFamily="34" charset="0"/>
+              </a:rPr>
+              <a:t>Figure 3: Telehealth Visits by Enrollment Status</a:t>
+            </a:r>
+            <a:endParaRPr kumimoji="0" lang="en-US" altLang="en-US" sz="3200" b="1" u="none" strike="noStrike" cap="none" normalizeH="0" baseline="0" dirty="0">
+              <a:ln>
+                <a:noFill/>
+              </a:ln>
+              <a:solidFill>
+                <a:schemeClr val="tx1"/>
+              </a:solidFill>
+              <a:effectLst/>
+              <a:latin typeface="Arial" panose="020B0604020202020204" pitchFamily="34" charset="0"/>
+              <a:cs typeface="Arial" panose="020B0604020202020204" pitchFamily="34" charset="0"/>
+            </a:endParaRPr>
+          </a:p>
+          <a:p>
+            <a:pPr marL="0" marR="0" lvl="0" indent="0" algn="l" defTabSz="914400" rtl="0" eaLnBrk="0" fontAlgn="base" latinLnBrk="0" hangingPunct="0">
+              <a:lnSpc>
+                <a:spcPct val="100000"/>
+              </a:lnSpc>
+              <a:spcBef>
+                <a:spcPct val="0"/>
+              </a:spcBef>
+              <a:spcAft>
+                <a:spcPct val="0"/>
+              </a:spcAft>
+              <a:buClrTx/>
+              <a:buSzTx/>
+              <a:buFontTx/>
+              <a:buNone/>
+              <a:tabLst/>
+            </a:pPr>
+            <a:endParaRPr kumimoji="0" lang="en-US" altLang="en-US" sz="1800" b="0" i="0" u="none" strike="noStrike" cap="none" normalizeH="0" baseline="0" dirty="0">
+              <a:ln>
+                <a:noFill/>
+              </a:ln>
+              <a:solidFill>
+                <a:schemeClr val="tx1"/>
+              </a:solidFill>
+              <a:effectLst/>
+              <a:latin typeface="Arial" panose="020B0604020202020204" pitchFamily="34" charset="0"/>
+            </a:endParaRPr>
+          </a:p>
+        </p:txBody>
+      </p:sp>
+      <p:pic>
+        <p:nvPicPr>
+          <p:cNvPr id="50" name="Picture 49" descr="A graph of a bar chart&#10;&#10;AI-generated content may be incorrect.">
+            <a:extLst>
+              <a:ext uri="{FF2B5EF4-FFF2-40B4-BE49-F238E27FC236}">
+                <a16:creationId xmlns:a16="http://schemas.microsoft.com/office/drawing/2014/main" id="{8F29E8C0-D54E-3639-BA27-8C9D3600C5E6}"/>
+              </a:ext>
+            </a:extLst>
+          </p:cNvPr>
+          <p:cNvPicPr>
+            <a:picLocks noChangeAspect="1"/>
+          </p:cNvPicPr>
+          <p:nvPr/>
+        </p:nvPicPr>
+        <p:blipFill>
+          <a:blip r:embed="rId10" cstate="print">
+            <a:extLst>
+              <a:ext uri="{28A0092B-C50C-407E-A947-70E740481C1C}">
+                <a14:useLocalDpi xmlns:a14="http://schemas.microsoft.com/office/drawing/2010/main" val="0"/>
+              </a:ext>
+            </a:extLst>
+          </a:blip>
+          <a:stretch>
+            <a:fillRect/>
+          </a:stretch>
+        </p:blipFill>
+        <p:spPr>
+          <a:xfrm>
+            <a:off x="10986674" y="24504907"/>
+            <a:ext cx="10602173" cy="7580453"/>
+          </a:xfrm>
+          <a:prstGeom prst="rect">
+            <a:avLst/>
+          </a:prstGeom>
+          <a:ln>
+            <a:solidFill>
+              <a:schemeClr val="tx1"/>
+            </a:solidFill>
+          </a:ln>
         </p:spPr>
       </p:pic>
     </p:spTree>

</xml_diff>